<commit_message>
Update the slide deck
</commit_message>
<xml_diff>
--- a/Global Azure London - 2023-05-12.pptx
+++ b/Global Azure London - 2023-05-12.pptx
@@ -7,6 +7,9 @@
   <p:sldIdLst>
     <p:sldId id="256" r:id="rId2"/>
     <p:sldId id="257" r:id="rId3"/>
+    <p:sldId id="258" r:id="rId4"/>
+    <p:sldId id="259" r:id="rId5"/>
+    <p:sldId id="260" r:id="rId6"/>
   </p:sldIdLst>
   <p:sldSz cx="12192000" cy="6858000"/>
   <p:notesSz cx="6858000" cy="9144000"/>
@@ -5891,14 +5894,6 @@
           <a:bodyPr/>
           <a:lstStyle/>
           <a:p>
-            <a:r>
-              <a:rPr lang="en-US" i="1" dirty="0"/>
-              <a:t>Or</a:t>
-            </a:r>
-            <a:r>
-              <a:rPr lang="en-US" dirty="0"/>
-              <a:t> </a:t>
-            </a:r>
             <a:r>
               <a:rPr lang="en-US" b="1" dirty="0"/>
               <a:t>Abusing the Azure Functions Runtime for fun and profit</a:t>
@@ -6705,36 +6700,16 @@
           <a:prstGeom prst="rect">
             <a:avLst/>
           </a:prstGeom>
-          <a:solidFill>
-            <a:srgbClr val="FFFFFF">
-              <a:shade val="85000"/>
-            </a:srgbClr>
-          </a:solidFill>
-          <a:ln w="88900" cap="sq">
-            <a:solidFill>
-              <a:srgbClr val="FFFFFF"/>
-            </a:solidFill>
-            <a:miter lim="800000"/>
+          <a:ln>
+            <a:noFill/>
           </a:ln>
           <a:effectLst>
-            <a:outerShdw blurRad="55000" dist="18000" dir="5400000" algn="tl" rotWithShape="0">
+            <a:outerShdw blurRad="190500" algn="tl" rotWithShape="0">
               <a:srgbClr val="000000">
-                <a:alpha val="40000"/>
+                <a:alpha val="70000"/>
               </a:srgbClr>
             </a:outerShdw>
           </a:effectLst>
-          <a:scene3d>
-            <a:camera prst="orthographicFront"/>
-            <a:lightRig rig="twoPt" dir="t">
-              <a:rot lat="0" lon="0" rev="7200000"/>
-            </a:lightRig>
-          </a:scene3d>
-          <a:sp3d>
-            <a:bevelT w="25400" h="19050"/>
-            <a:contourClr>
-              <a:srgbClr val="FFFFFF"/>
-            </a:contourClr>
-          </a:sp3d>
         </p:spPr>
       </p:pic>
       <p:sp>
@@ -6769,7 +6744,143 @@
               <a:buFont typeface="Wingdings 3" charset="2"/>
               <a:buChar char=""/>
             </a:pPr>
-            <a:endParaRPr lang="en-US" sz="1500"/>
+            <a:r>
+              <a:rPr lang="en-US" sz="1500" dirty="0"/>
+              <a:t> Instances expose</a:t>
+            </a:r>
+            <a:br>
+              <a:rPr lang="en-US" sz="1500" dirty="0"/>
+            </a:br>
+            <a:r>
+              <a:rPr lang="en-US" sz="1500" dirty="0"/>
+              <a:t>    health endpoint</a:t>
+            </a:r>
+          </a:p>
+          <a:p>
+            <a:pPr lvl="1">
+              <a:buFont typeface="Wingdings 3" charset="2"/>
+              <a:buChar char=""/>
+            </a:pPr>
+            <a:r>
+              <a:rPr lang="en-US" sz="1500" dirty="0"/>
+              <a:t> 👍 Healthy</a:t>
+            </a:r>
+          </a:p>
+          <a:p>
+            <a:pPr lvl="1">
+              <a:buFont typeface="Wingdings 3" charset="2"/>
+              <a:buChar char=""/>
+            </a:pPr>
+            <a:r>
+              <a:rPr lang="en-US" sz="1500" dirty="0"/>
+              <a:t> 🤢 Degraded</a:t>
+            </a:r>
+          </a:p>
+          <a:p>
+            <a:pPr lvl="1">
+              <a:buFont typeface="Wingdings 3" charset="2"/>
+              <a:buChar char=""/>
+            </a:pPr>
+            <a:r>
+              <a:rPr lang="en-US" sz="1500" dirty="0"/>
+              <a:t> ☠️ ☠️ ☠️</a:t>
+            </a:r>
+          </a:p>
+          <a:p>
+            <a:pPr>
+              <a:buFont typeface="Wingdings 3" charset="2"/>
+              <a:buChar char=""/>
+            </a:pPr>
+            <a:endParaRPr lang="en-US" sz="1500" dirty="0"/>
+          </a:p>
+          <a:p>
+            <a:pPr>
+              <a:buFont typeface="Wingdings 3" charset="2"/>
+              <a:buChar char=""/>
+            </a:pPr>
+            <a:r>
+              <a:rPr lang="en-US" sz="1500" dirty="0"/>
+              <a:t> Monitoring systems poll</a:t>
+            </a:r>
+            <a:br>
+              <a:rPr lang="en-US" sz="1500" dirty="0"/>
+            </a:br>
+            <a:r>
+              <a:rPr lang="en-US" sz="1500" dirty="0"/>
+              <a:t>   health endpoints of all</a:t>
+            </a:r>
+            <a:br>
+              <a:rPr lang="en-US" sz="1500" dirty="0"/>
+            </a:br>
+            <a:r>
+              <a:rPr lang="en-US" sz="1500" dirty="0"/>
+              <a:t>   instances</a:t>
+            </a:r>
+          </a:p>
+          <a:p>
+            <a:pPr lvl="1">
+              <a:buFont typeface="Wingdings 3" charset="2"/>
+              <a:buChar char=""/>
+            </a:pPr>
+            <a:r>
+              <a:rPr lang="en-US" sz="1500" dirty="0"/>
+              <a:t> Traffic routed</a:t>
+            </a:r>
+            <a:br>
+              <a:rPr lang="en-US" sz="1500" dirty="0"/>
+            </a:br>
+            <a:r>
+              <a:rPr lang="en-US" sz="1500" dirty="0"/>
+              <a:t>   accordingly</a:t>
+            </a:r>
+          </a:p>
+        </p:txBody>
+      </p:sp>
+      <p:sp>
+        <p:nvSpPr>
+          <p:cNvPr id="6" name="TextBox 5">
+            <a:extLst>
+              <a:ext uri="{FF2B5EF4-FFF2-40B4-BE49-F238E27FC236}">
+                <a16:creationId xmlns:a16="http://schemas.microsoft.com/office/drawing/2014/main" id="{388598A2-8999-9356-3F0C-0BD390B53A05}"/>
+              </a:ext>
+            </a:extLst>
+          </p:cNvPr>
+          <p:cNvSpPr txBox="1"/>
+          <p:nvPr/>
+        </p:nvSpPr>
+        <p:spPr>
+          <a:xfrm>
+            <a:off x="601757" y="6537434"/>
+            <a:ext cx="3890809" cy="230832"/>
+          </a:xfrm>
+          <a:prstGeom prst="rect">
+            <a:avLst/>
+          </a:prstGeom>
+          <a:noFill/>
+        </p:spPr>
+        <p:txBody>
+          <a:bodyPr wrap="none" rtlCol="0">
+            <a:spAutoFit/>
+          </a:bodyPr>
+          <a:lstStyle/>
+          <a:p>
+            <a:r>
+              <a:rPr lang="en-US" sz="900" dirty="0"/>
+              <a:t>https://</a:t>
+            </a:r>
+            <a:r>
+              <a:rPr lang="en-US" sz="900" dirty="0" err="1"/>
+              <a:t>microservices.io</a:t>
+            </a:r>
+            <a:r>
+              <a:rPr lang="en-US" sz="900" dirty="0"/>
+              <a:t>/patterns/observability/health-check-</a:t>
+            </a:r>
+            <a:r>
+              <a:rPr lang="en-US" sz="900" dirty="0" err="1"/>
+              <a:t>api.html</a:t>
+            </a:r>
+            <a:endParaRPr lang="en-US" sz="900" dirty="0"/>
           </a:p>
         </p:txBody>
       </p:sp>
@@ -6783,6 +6894,1759 @@
   <p:clrMapOvr>
     <a:masterClrMapping/>
   </p:clrMapOvr>
+</p:sld>
+</file>
+
+<file path=ppt/slides/slide3.xml><?xml version="1.0" encoding="utf-8"?>
+<p:sld xmlns:a="http://schemas.openxmlformats.org/drawingml/2006/main" xmlns:r="http://schemas.openxmlformats.org/officeDocument/2006/relationships" xmlns:p="http://schemas.openxmlformats.org/presentationml/2006/main">
+  <p:cSld>
+    <p:spTree>
+      <p:nvGrpSpPr>
+        <p:cNvPr id="1" name=""/>
+        <p:cNvGrpSpPr/>
+        <p:nvPr/>
+      </p:nvGrpSpPr>
+      <p:grpSpPr>
+        <a:xfrm>
+          <a:off x="0" y="0"/>
+          <a:ext cx="0" cy="0"/>
+          <a:chOff x="0" y="0"/>
+          <a:chExt cx="0" cy="0"/>
+        </a:xfrm>
+      </p:grpSpPr>
+      <p:sp>
+        <p:nvSpPr>
+          <p:cNvPr id="2" name="Title 1">
+            <a:extLst>
+              <a:ext uri="{FF2B5EF4-FFF2-40B4-BE49-F238E27FC236}">
+                <a16:creationId xmlns:a16="http://schemas.microsoft.com/office/drawing/2014/main" id="{AA3186D4-3D04-A195-072B-364848ACA4CA}"/>
+              </a:ext>
+            </a:extLst>
+          </p:cNvPr>
+          <p:cNvSpPr>
+            <a:spLocks noGrp="1"/>
+          </p:cNvSpPr>
+          <p:nvPr>
+            <p:ph type="title"/>
+          </p:nvPr>
+        </p:nvSpPr>
+        <p:spPr/>
+        <p:txBody>
+          <a:bodyPr/>
+          <a:lstStyle/>
+          <a:p>
+            <a:r>
+              <a:rPr lang="en-US" dirty="0" err="1"/>
+              <a:t>ASP.Net</a:t>
+            </a:r>
+            <a:r>
+              <a:rPr lang="en-US" dirty="0"/>
+              <a:t> Web API</a:t>
+            </a:r>
+          </a:p>
+        </p:txBody>
+      </p:sp>
+      <p:sp>
+        <p:nvSpPr>
+          <p:cNvPr id="3" name="Content Placeholder 2">
+            <a:extLst>
+              <a:ext uri="{FF2B5EF4-FFF2-40B4-BE49-F238E27FC236}">
+                <a16:creationId xmlns:a16="http://schemas.microsoft.com/office/drawing/2014/main" id="{8FC83EEB-EFAA-B895-4D5D-B881228B78B3}"/>
+              </a:ext>
+            </a:extLst>
+          </p:cNvPr>
+          <p:cNvSpPr>
+            <a:spLocks noGrp="1"/>
+          </p:cNvSpPr>
+          <p:nvPr>
+            <p:ph idx="1"/>
+          </p:nvPr>
+        </p:nvSpPr>
+        <p:spPr/>
+        <p:txBody>
+          <a:bodyPr/>
+          <a:lstStyle/>
+          <a:p>
+            <a:r>
+              <a:rPr lang="en-US" dirty="0"/>
+              <a:t>To add the standard health endpoint</a:t>
+            </a:r>
+          </a:p>
+          <a:p>
+            <a:endParaRPr lang="en-US" dirty="0"/>
+          </a:p>
+          <a:p>
+            <a:endParaRPr lang="en-US" dirty="0"/>
+          </a:p>
+          <a:p>
+            <a:endParaRPr lang="en-US" dirty="0"/>
+          </a:p>
+          <a:p>
+            <a:endParaRPr lang="en-US" dirty="0"/>
+          </a:p>
+          <a:p>
+            <a:endParaRPr lang="en-US" dirty="0"/>
+          </a:p>
+          <a:p>
+            <a:r>
+              <a:rPr lang="en-US" dirty="0"/>
+              <a:t>Then add health checks</a:t>
+            </a:r>
+          </a:p>
+        </p:txBody>
+      </p:sp>
+      <p:pic>
+        <p:nvPicPr>
+          <p:cNvPr id="4" name="Picture 3">
+            <a:extLst>
+              <a:ext uri="{FF2B5EF4-FFF2-40B4-BE49-F238E27FC236}">
+                <a16:creationId xmlns:a16="http://schemas.microsoft.com/office/drawing/2014/main" id="{D605613A-C58E-F064-5633-B20F00B7CB0F}"/>
+              </a:ext>
+            </a:extLst>
+          </p:cNvPr>
+          <p:cNvPicPr>
+            <a:picLocks noChangeAspect="1"/>
+          </p:cNvPicPr>
+          <p:nvPr/>
+        </p:nvPicPr>
+        <p:blipFill>
+          <a:blip r:embed="rId2"/>
+          <a:stretch>
+            <a:fillRect/>
+          </a:stretch>
+        </p:blipFill>
+        <p:spPr>
+          <a:xfrm>
+            <a:off x="1089468" y="2838917"/>
+            <a:ext cx="7772400" cy="1180165"/>
+          </a:xfrm>
+          <a:prstGeom prst="rect">
+            <a:avLst/>
+          </a:prstGeom>
+          <a:ln>
+            <a:noFill/>
+          </a:ln>
+          <a:effectLst>
+            <a:outerShdw blurRad="190500" algn="tl" rotWithShape="0">
+              <a:srgbClr val="000000">
+                <a:alpha val="70000"/>
+              </a:srgbClr>
+            </a:outerShdw>
+          </a:effectLst>
+        </p:spPr>
+      </p:pic>
+      <p:pic>
+        <p:nvPicPr>
+          <p:cNvPr id="5" name="Picture 4">
+            <a:extLst>
+              <a:ext uri="{FF2B5EF4-FFF2-40B4-BE49-F238E27FC236}">
+                <a16:creationId xmlns:a16="http://schemas.microsoft.com/office/drawing/2014/main" id="{FE768E1A-C028-0C0C-B3D1-75A01F297D68}"/>
+              </a:ext>
+            </a:extLst>
+          </p:cNvPr>
+          <p:cNvPicPr>
+            <a:picLocks noChangeAspect="1"/>
+          </p:cNvPicPr>
+          <p:nvPr/>
+        </p:nvPicPr>
+        <p:blipFill rotWithShape="1">
+          <a:blip r:embed="rId3"/>
+          <a:srcRect l="2451" t="2784" r="1593" b="3097"/>
+          <a:stretch/>
+        </p:blipFill>
+        <p:spPr>
+          <a:xfrm>
+            <a:off x="5807886" y="3282255"/>
+            <a:ext cx="5706780" cy="3290691"/>
+          </a:xfrm>
+          <a:prstGeom prst="rect">
+            <a:avLst/>
+          </a:prstGeom>
+          <a:ln>
+            <a:noFill/>
+          </a:ln>
+          <a:effectLst>
+            <a:outerShdw blurRad="190500" algn="tl" rotWithShape="0">
+              <a:srgbClr val="000000">
+                <a:alpha val="70000"/>
+              </a:srgbClr>
+            </a:outerShdw>
+          </a:effectLst>
+        </p:spPr>
+      </p:pic>
+    </p:spTree>
+    <p:extLst>
+      <p:ext uri="{BB962C8B-B14F-4D97-AF65-F5344CB8AC3E}">
+        <p14:creationId xmlns:p14="http://schemas.microsoft.com/office/powerpoint/2010/main" val="2773806434"/>
+      </p:ext>
+    </p:extLst>
+  </p:cSld>
+  <p:clrMapOvr>
+    <a:masterClrMapping/>
+  </p:clrMapOvr>
+  <p:timing>
+    <p:tnLst>
+      <p:par>
+        <p:cTn id="1" dur="indefinite" restart="never" nodeType="tmRoot">
+          <p:childTnLst>
+            <p:seq concurrent="1" nextAc="seek">
+              <p:cTn id="2" dur="indefinite" nodeType="mainSeq">
+                <p:childTnLst>
+                  <p:par>
+                    <p:cTn id="3" fill="hold">
+                      <p:stCondLst>
+                        <p:cond delay="indefinite"/>
+                      </p:stCondLst>
+                      <p:childTnLst>
+                        <p:par>
+                          <p:cTn id="4" fill="hold">
+                            <p:stCondLst>
+                              <p:cond delay="0"/>
+                            </p:stCondLst>
+                            <p:childTnLst>
+                              <p:par>
+                                <p:cTn id="5" presetID="9" presetClass="entr" presetSubtype="0" fill="hold" nodeType="clickEffect">
+                                  <p:stCondLst>
+                                    <p:cond delay="0"/>
+                                  </p:stCondLst>
+                                  <p:childTnLst>
+                                    <p:set>
+                                      <p:cBhvr>
+                                        <p:cTn id="6" dur="1" fill="hold">
+                                          <p:stCondLst>
+                                            <p:cond delay="0"/>
+                                          </p:stCondLst>
+                                        </p:cTn>
+                                        <p:tgtEl>
+                                          <p:spTgt spid="5"/>
+                                        </p:tgtEl>
+                                        <p:attrNameLst>
+                                          <p:attrName>style.visibility</p:attrName>
+                                        </p:attrNameLst>
+                                      </p:cBhvr>
+                                      <p:to>
+                                        <p:strVal val="visible"/>
+                                      </p:to>
+                                    </p:set>
+                                    <p:animEffect transition="in" filter="dissolve">
+                                      <p:cBhvr>
+                                        <p:cTn id="7" dur="500"/>
+                                        <p:tgtEl>
+                                          <p:spTgt spid="5"/>
+                                        </p:tgtEl>
+                                      </p:cBhvr>
+                                    </p:animEffect>
+                                  </p:childTnLst>
+                                </p:cTn>
+                              </p:par>
+                            </p:childTnLst>
+                          </p:cTn>
+                        </p:par>
+                      </p:childTnLst>
+                    </p:cTn>
+                  </p:par>
+                </p:childTnLst>
+              </p:cTn>
+              <p:prevCondLst>
+                <p:cond evt="onPrev" delay="0">
+                  <p:tgtEl>
+                    <p:sldTgt/>
+                  </p:tgtEl>
+                </p:cond>
+              </p:prevCondLst>
+              <p:nextCondLst>
+                <p:cond evt="onNext" delay="0">
+                  <p:tgtEl>
+                    <p:sldTgt/>
+                  </p:tgtEl>
+                </p:cond>
+              </p:nextCondLst>
+            </p:seq>
+          </p:childTnLst>
+        </p:cTn>
+      </p:par>
+    </p:tnLst>
+  </p:timing>
+</p:sld>
+</file>
+
+<file path=ppt/slides/slide4.xml><?xml version="1.0" encoding="utf-8"?>
+<p:sld xmlns:a="http://schemas.openxmlformats.org/drawingml/2006/main" xmlns:r="http://schemas.openxmlformats.org/officeDocument/2006/relationships" xmlns:p="http://schemas.openxmlformats.org/presentationml/2006/main">
+  <p:cSld>
+    <p:spTree>
+      <p:nvGrpSpPr>
+        <p:cNvPr id="1" name=""/>
+        <p:cNvGrpSpPr/>
+        <p:nvPr/>
+      </p:nvGrpSpPr>
+      <p:grpSpPr>
+        <a:xfrm>
+          <a:off x="0" y="0"/>
+          <a:ext cx="0" cy="0"/>
+          <a:chOff x="0" y="0"/>
+          <a:chExt cx="0" cy="0"/>
+        </a:xfrm>
+      </p:grpSpPr>
+      <p:sp>
+        <p:nvSpPr>
+          <p:cNvPr id="2" name="Title 1">
+            <a:extLst>
+              <a:ext uri="{FF2B5EF4-FFF2-40B4-BE49-F238E27FC236}">
+                <a16:creationId xmlns:a16="http://schemas.microsoft.com/office/drawing/2014/main" id="{28D3AA1A-248E-2750-8A9D-35739DAB4C1F}"/>
+              </a:ext>
+            </a:extLst>
+          </p:cNvPr>
+          <p:cNvSpPr>
+            <a:spLocks noGrp="1"/>
+          </p:cNvSpPr>
+          <p:nvPr>
+            <p:ph type="title"/>
+          </p:nvPr>
+        </p:nvSpPr>
+        <p:spPr/>
+        <p:txBody>
+          <a:bodyPr/>
+          <a:lstStyle/>
+          <a:p>
+            <a:r>
+              <a:rPr lang="en-US" dirty="0"/>
+              <a:t>Azure Function Apps</a:t>
+            </a:r>
+          </a:p>
+        </p:txBody>
+      </p:sp>
+      <p:sp>
+        <p:nvSpPr>
+          <p:cNvPr id="3" name="Content Placeholder 2">
+            <a:extLst>
+              <a:ext uri="{FF2B5EF4-FFF2-40B4-BE49-F238E27FC236}">
+                <a16:creationId xmlns:a16="http://schemas.microsoft.com/office/drawing/2014/main" id="{E9B8755C-636F-C4B4-6212-0B324F518DCB}"/>
+              </a:ext>
+            </a:extLst>
+          </p:cNvPr>
+          <p:cNvSpPr>
+            <a:spLocks noGrp="1"/>
+          </p:cNvSpPr>
+          <p:nvPr>
+            <p:ph idx="1"/>
+          </p:nvPr>
+        </p:nvSpPr>
+        <p:spPr/>
+        <p:txBody>
+          <a:bodyPr/>
+          <a:lstStyle/>
+          <a:p>
+            <a:r>
+              <a:rPr lang="en-US" dirty="0"/>
+              <a:t>Azure Functions Runtime</a:t>
+            </a:r>
+          </a:p>
+          <a:p>
+            <a:endParaRPr lang="en-US" dirty="0"/>
+          </a:p>
+          <a:p>
+            <a:pPr lvl="1"/>
+            <a:r>
+              <a:rPr lang="en-US" dirty="0"/>
+              <a:t>Doesn’t support </a:t>
+            </a:r>
+            <a:r>
+              <a:rPr lang="en-US" sz="1800" dirty="0" err="1">
+                <a:latin typeface="Courier" pitchFamily="2" charset="0"/>
+              </a:rPr>
+              <a:t>WebApplicationBuilder</a:t>
+            </a:r>
+            <a:r>
+              <a:rPr lang="en-US" dirty="0"/>
+              <a:t> 😢</a:t>
+            </a:r>
+          </a:p>
+          <a:p>
+            <a:pPr lvl="1"/>
+            <a:r>
+              <a:rPr lang="en-US" dirty="0"/>
+              <a:t>Doesn’t support programmatic routing 😞</a:t>
+            </a:r>
+          </a:p>
+          <a:p>
+            <a:pPr lvl="1"/>
+            <a:r>
+              <a:rPr lang="en-US" dirty="0"/>
+              <a:t>Doesn’t support functions in separate assemblies 😫</a:t>
+            </a:r>
+          </a:p>
+          <a:p>
+            <a:pPr lvl="1"/>
+            <a:endParaRPr lang="en-US" dirty="0"/>
+          </a:p>
+          <a:p>
+            <a:pPr lvl="1"/>
+            <a:r>
+              <a:rPr lang="en-US" dirty="0"/>
+              <a:t>Does support ‘Extensions’ 😎</a:t>
+            </a:r>
+          </a:p>
+        </p:txBody>
+      </p:sp>
+      <p:sp>
+        <p:nvSpPr>
+          <p:cNvPr id="4" name="TextBox 3">
+            <a:extLst>
+              <a:ext uri="{FF2B5EF4-FFF2-40B4-BE49-F238E27FC236}">
+                <a16:creationId xmlns:a16="http://schemas.microsoft.com/office/drawing/2014/main" id="{A487C9A4-614B-721A-2A92-2DB7C078D88F}"/>
+              </a:ext>
+            </a:extLst>
+          </p:cNvPr>
+          <p:cNvSpPr txBox="1"/>
+          <p:nvPr/>
+        </p:nvSpPr>
+        <p:spPr>
+          <a:xfrm rot="20823561">
+            <a:off x="2228193" y="5286704"/>
+            <a:ext cx="6800193" cy="369332"/>
+          </a:xfrm>
+          <a:prstGeom prst="rect">
+            <a:avLst/>
+          </a:prstGeom>
+          <a:noFill/>
+        </p:spPr>
+        <p:txBody>
+          <a:bodyPr wrap="square" rtlCol="0">
+            <a:spAutoFit/>
+          </a:bodyPr>
+          <a:lstStyle/>
+          <a:p>
+            <a:r>
+              <a:rPr lang="en-US" dirty="0"/>
+              <a:t>https://</a:t>
+            </a:r>
+            <a:r>
+              <a:rPr lang="en-US" dirty="0" err="1"/>
+              <a:t>github.com</a:t>
+            </a:r>
+            <a:r>
+              <a:rPr lang="en-US" dirty="0"/>
+              <a:t>/Azure/azure-functions-</a:t>
+            </a:r>
+            <a:r>
+              <a:rPr lang="en-US" dirty="0" err="1"/>
+              <a:t>openapi</a:t>
+            </a:r>
+            <a:r>
+              <a:rPr lang="en-US" dirty="0"/>
+              <a:t>-extension</a:t>
+            </a:r>
+          </a:p>
+        </p:txBody>
+      </p:sp>
+    </p:spTree>
+    <p:extLst>
+      <p:ext uri="{BB962C8B-B14F-4D97-AF65-F5344CB8AC3E}">
+        <p14:creationId xmlns:p14="http://schemas.microsoft.com/office/powerpoint/2010/main" val="3649405756"/>
+      </p:ext>
+    </p:extLst>
+  </p:cSld>
+  <p:clrMapOvr>
+    <a:masterClrMapping/>
+  </p:clrMapOvr>
+  <p:timing>
+    <p:tnLst>
+      <p:par>
+        <p:cTn id="1" dur="indefinite" restart="never" nodeType="tmRoot">
+          <p:childTnLst>
+            <p:seq concurrent="1" nextAc="seek">
+              <p:cTn id="2" dur="indefinite" nodeType="mainSeq">
+                <p:childTnLst>
+                  <p:par>
+                    <p:cTn id="3" fill="hold">
+                      <p:stCondLst>
+                        <p:cond delay="indefinite"/>
+                      </p:stCondLst>
+                      <p:childTnLst>
+                        <p:par>
+                          <p:cTn id="4" fill="hold">
+                            <p:stCondLst>
+                              <p:cond delay="0"/>
+                            </p:stCondLst>
+                            <p:childTnLst>
+                              <p:par>
+                                <p:cTn id="5" presetID="9" presetClass="entr" presetSubtype="0" fill="hold" nodeType="clickEffect">
+                                  <p:stCondLst>
+                                    <p:cond delay="0"/>
+                                  </p:stCondLst>
+                                  <p:childTnLst>
+                                    <p:set>
+                                      <p:cBhvr>
+                                        <p:cTn id="6" dur="1" fill="hold">
+                                          <p:stCondLst>
+                                            <p:cond delay="0"/>
+                                          </p:stCondLst>
+                                        </p:cTn>
+                                        <p:tgtEl>
+                                          <p:spTgt spid="3">
+                                            <p:txEl>
+                                              <p:pRg st="2" end="2"/>
+                                            </p:txEl>
+                                          </p:spTgt>
+                                        </p:tgtEl>
+                                        <p:attrNameLst>
+                                          <p:attrName>style.visibility</p:attrName>
+                                        </p:attrNameLst>
+                                      </p:cBhvr>
+                                      <p:to>
+                                        <p:strVal val="visible"/>
+                                      </p:to>
+                                    </p:set>
+                                    <p:animEffect transition="in" filter="dissolve">
+                                      <p:cBhvr>
+                                        <p:cTn id="7" dur="500"/>
+                                        <p:tgtEl>
+                                          <p:spTgt spid="3">
+                                            <p:txEl>
+                                              <p:pRg st="2" end="2"/>
+                                            </p:txEl>
+                                          </p:spTgt>
+                                        </p:tgtEl>
+                                      </p:cBhvr>
+                                    </p:animEffect>
+                                  </p:childTnLst>
+                                </p:cTn>
+                              </p:par>
+                            </p:childTnLst>
+                          </p:cTn>
+                        </p:par>
+                        <p:par>
+                          <p:cTn id="8" fill="hold">
+                            <p:stCondLst>
+                              <p:cond delay="500"/>
+                            </p:stCondLst>
+                            <p:childTnLst>
+                              <p:par>
+                                <p:cTn id="9" presetID="9" presetClass="entr" presetSubtype="0" fill="hold" nodeType="afterEffect">
+                                  <p:stCondLst>
+                                    <p:cond delay="0"/>
+                                  </p:stCondLst>
+                                  <p:childTnLst>
+                                    <p:set>
+                                      <p:cBhvr>
+                                        <p:cTn id="10" dur="1" fill="hold">
+                                          <p:stCondLst>
+                                            <p:cond delay="0"/>
+                                          </p:stCondLst>
+                                        </p:cTn>
+                                        <p:tgtEl>
+                                          <p:spTgt spid="3">
+                                            <p:txEl>
+                                              <p:pRg st="3" end="3"/>
+                                            </p:txEl>
+                                          </p:spTgt>
+                                        </p:tgtEl>
+                                        <p:attrNameLst>
+                                          <p:attrName>style.visibility</p:attrName>
+                                        </p:attrNameLst>
+                                      </p:cBhvr>
+                                      <p:to>
+                                        <p:strVal val="visible"/>
+                                      </p:to>
+                                    </p:set>
+                                    <p:animEffect transition="in" filter="dissolve">
+                                      <p:cBhvr>
+                                        <p:cTn id="11" dur="500"/>
+                                        <p:tgtEl>
+                                          <p:spTgt spid="3">
+                                            <p:txEl>
+                                              <p:pRg st="3" end="3"/>
+                                            </p:txEl>
+                                          </p:spTgt>
+                                        </p:tgtEl>
+                                      </p:cBhvr>
+                                    </p:animEffect>
+                                  </p:childTnLst>
+                                </p:cTn>
+                              </p:par>
+                            </p:childTnLst>
+                          </p:cTn>
+                        </p:par>
+                        <p:par>
+                          <p:cTn id="12" fill="hold">
+                            <p:stCondLst>
+                              <p:cond delay="1000"/>
+                            </p:stCondLst>
+                            <p:childTnLst>
+                              <p:par>
+                                <p:cTn id="13" presetID="9" presetClass="entr" presetSubtype="0" fill="hold" nodeType="afterEffect">
+                                  <p:stCondLst>
+                                    <p:cond delay="0"/>
+                                  </p:stCondLst>
+                                  <p:childTnLst>
+                                    <p:set>
+                                      <p:cBhvr>
+                                        <p:cTn id="14" dur="1" fill="hold">
+                                          <p:stCondLst>
+                                            <p:cond delay="0"/>
+                                          </p:stCondLst>
+                                        </p:cTn>
+                                        <p:tgtEl>
+                                          <p:spTgt spid="3">
+                                            <p:txEl>
+                                              <p:pRg st="4" end="4"/>
+                                            </p:txEl>
+                                          </p:spTgt>
+                                        </p:tgtEl>
+                                        <p:attrNameLst>
+                                          <p:attrName>style.visibility</p:attrName>
+                                        </p:attrNameLst>
+                                      </p:cBhvr>
+                                      <p:to>
+                                        <p:strVal val="visible"/>
+                                      </p:to>
+                                    </p:set>
+                                    <p:animEffect transition="in" filter="dissolve">
+                                      <p:cBhvr>
+                                        <p:cTn id="15" dur="500"/>
+                                        <p:tgtEl>
+                                          <p:spTgt spid="3">
+                                            <p:txEl>
+                                              <p:pRg st="4" end="4"/>
+                                            </p:txEl>
+                                          </p:spTgt>
+                                        </p:tgtEl>
+                                      </p:cBhvr>
+                                    </p:animEffect>
+                                  </p:childTnLst>
+                                </p:cTn>
+                              </p:par>
+                            </p:childTnLst>
+                          </p:cTn>
+                        </p:par>
+                      </p:childTnLst>
+                    </p:cTn>
+                  </p:par>
+                  <p:par>
+                    <p:cTn id="16" fill="hold">
+                      <p:stCondLst>
+                        <p:cond delay="indefinite"/>
+                      </p:stCondLst>
+                      <p:childTnLst>
+                        <p:par>
+                          <p:cTn id="17" fill="hold">
+                            <p:stCondLst>
+                              <p:cond delay="0"/>
+                            </p:stCondLst>
+                            <p:childTnLst>
+                              <p:par>
+                                <p:cTn id="18" presetID="9" presetClass="entr" presetSubtype="0" fill="hold" nodeType="clickEffect">
+                                  <p:stCondLst>
+                                    <p:cond delay="0"/>
+                                  </p:stCondLst>
+                                  <p:childTnLst>
+                                    <p:set>
+                                      <p:cBhvr>
+                                        <p:cTn id="19" dur="1" fill="hold">
+                                          <p:stCondLst>
+                                            <p:cond delay="0"/>
+                                          </p:stCondLst>
+                                        </p:cTn>
+                                        <p:tgtEl>
+                                          <p:spTgt spid="3">
+                                            <p:txEl>
+                                              <p:pRg st="6" end="6"/>
+                                            </p:txEl>
+                                          </p:spTgt>
+                                        </p:tgtEl>
+                                        <p:attrNameLst>
+                                          <p:attrName>style.visibility</p:attrName>
+                                        </p:attrNameLst>
+                                      </p:cBhvr>
+                                      <p:to>
+                                        <p:strVal val="visible"/>
+                                      </p:to>
+                                    </p:set>
+                                    <p:animEffect transition="in" filter="dissolve">
+                                      <p:cBhvr>
+                                        <p:cTn id="20" dur="500"/>
+                                        <p:tgtEl>
+                                          <p:spTgt spid="3">
+                                            <p:txEl>
+                                              <p:pRg st="6" end="6"/>
+                                            </p:txEl>
+                                          </p:spTgt>
+                                        </p:tgtEl>
+                                      </p:cBhvr>
+                                    </p:animEffect>
+                                  </p:childTnLst>
+                                </p:cTn>
+                              </p:par>
+                            </p:childTnLst>
+                          </p:cTn>
+                        </p:par>
+                        <p:par>
+                          <p:cTn id="21" fill="hold">
+                            <p:stCondLst>
+                              <p:cond delay="500"/>
+                            </p:stCondLst>
+                            <p:childTnLst>
+                              <p:par>
+                                <p:cTn id="22" presetID="9" presetClass="entr" presetSubtype="0" fill="hold" grpId="0" nodeType="afterEffect">
+                                  <p:stCondLst>
+                                    <p:cond delay="0"/>
+                                  </p:stCondLst>
+                                  <p:childTnLst>
+                                    <p:set>
+                                      <p:cBhvr>
+                                        <p:cTn id="23" dur="1" fill="hold">
+                                          <p:stCondLst>
+                                            <p:cond delay="0"/>
+                                          </p:stCondLst>
+                                        </p:cTn>
+                                        <p:tgtEl>
+                                          <p:spTgt spid="4"/>
+                                        </p:tgtEl>
+                                        <p:attrNameLst>
+                                          <p:attrName>style.visibility</p:attrName>
+                                        </p:attrNameLst>
+                                      </p:cBhvr>
+                                      <p:to>
+                                        <p:strVal val="visible"/>
+                                      </p:to>
+                                    </p:set>
+                                    <p:animEffect transition="in" filter="dissolve">
+                                      <p:cBhvr>
+                                        <p:cTn id="24" dur="500"/>
+                                        <p:tgtEl>
+                                          <p:spTgt spid="4"/>
+                                        </p:tgtEl>
+                                      </p:cBhvr>
+                                    </p:animEffect>
+                                  </p:childTnLst>
+                                </p:cTn>
+                              </p:par>
+                            </p:childTnLst>
+                          </p:cTn>
+                        </p:par>
+                      </p:childTnLst>
+                    </p:cTn>
+                  </p:par>
+                </p:childTnLst>
+              </p:cTn>
+              <p:prevCondLst>
+                <p:cond evt="onPrev" delay="0">
+                  <p:tgtEl>
+                    <p:sldTgt/>
+                  </p:tgtEl>
+                </p:cond>
+              </p:prevCondLst>
+              <p:nextCondLst>
+                <p:cond evt="onNext" delay="0">
+                  <p:tgtEl>
+                    <p:sldTgt/>
+                  </p:tgtEl>
+                </p:cond>
+              </p:nextCondLst>
+            </p:seq>
+          </p:childTnLst>
+        </p:cTn>
+      </p:par>
+    </p:tnLst>
+    <p:bldLst>
+      <p:bldP spid="4" grpId="0"/>
+    </p:bldLst>
+  </p:timing>
+</p:sld>
+</file>
+
+<file path=ppt/slides/slide5.xml><?xml version="1.0" encoding="utf-8"?>
+<p:sld xmlns:a="http://schemas.openxmlformats.org/drawingml/2006/main" xmlns:r="http://schemas.openxmlformats.org/officeDocument/2006/relationships" xmlns:p="http://schemas.openxmlformats.org/presentationml/2006/main">
+  <p:cSld>
+    <p:bg>
+      <p:bgPr>
+        <a:solidFill>
+          <a:schemeClr val="bg1"/>
+        </a:solidFill>
+        <a:effectLst/>
+      </p:bgPr>
+    </p:bg>
+    <p:spTree>
+      <p:nvGrpSpPr>
+        <p:cNvPr id="1" name=""/>
+        <p:cNvGrpSpPr/>
+        <p:nvPr/>
+      </p:nvGrpSpPr>
+      <p:grpSpPr>
+        <a:xfrm>
+          <a:off x="0" y="0"/>
+          <a:ext cx="0" cy="0"/>
+          <a:chOff x="0" y="0"/>
+          <a:chExt cx="0" cy="0"/>
+        </a:xfrm>
+      </p:grpSpPr>
+      <p:sp useBgFill="1">
+        <p:nvSpPr>
+          <p:cNvPr id="11" name="Rectangle 10">
+            <a:extLst>
+              <a:ext uri="{FF2B5EF4-FFF2-40B4-BE49-F238E27FC236}">
+                <a16:creationId xmlns:a16="http://schemas.microsoft.com/office/drawing/2014/main" id="{9F4444CE-BC8D-4D61-B303-4C05614E62AB}"/>
+              </a:ext>
+              <a:ext uri="{C183D7F6-B498-43B3-948B-1728B52AA6E4}">
+                <adec:decorative xmlns:adec="http://schemas.microsoft.com/office/drawing/2017/decorative" val="1"/>
+              </a:ext>
+            </a:extLst>
+          </p:cNvPr>
+          <p:cNvSpPr>
+            <a:spLocks noGrp="1" noRot="1" noChangeAspect="1" noMove="1" noResize="1" noEditPoints="1" noAdjustHandles="1" noChangeArrowheads="1" noChangeShapeType="1" noTextEdit="1"/>
+          </p:cNvSpPr>
+          <p:nvPr>
+            <p:extLst>
+              <p:ext uri="{386F3935-93C4-4BCD-93E2-E3B085C9AB24}">
+                <p16:designElem xmlns:p16="http://schemas.microsoft.com/office/powerpoint/2015/main" val="1"/>
+              </p:ext>
+            </p:extLst>
+          </p:nvPr>
+        </p:nvSpPr>
+        <p:spPr>
+          <a:xfrm>
+            <a:off x="0" y="0"/>
+            <a:ext cx="12192000" cy="6858000"/>
+          </a:xfrm>
+          <a:prstGeom prst="rect">
+            <a:avLst/>
+          </a:prstGeom>
+          <a:ln>
+            <a:noFill/>
+          </a:ln>
+        </p:spPr>
+        <p:style>
+          <a:lnRef idx="2">
+            <a:schemeClr val="accent1">
+              <a:shade val="50000"/>
+            </a:schemeClr>
+          </a:lnRef>
+          <a:fillRef idx="1">
+            <a:schemeClr val="accent1"/>
+          </a:fillRef>
+          <a:effectRef idx="0">
+            <a:schemeClr val="accent1"/>
+          </a:effectRef>
+          <a:fontRef idx="minor">
+            <a:schemeClr val="lt1"/>
+          </a:fontRef>
+        </p:style>
+        <p:txBody>
+          <a:bodyPr rtlCol="0" anchor="ctr"/>
+          <a:lstStyle/>
+          <a:p>
+            <a:pPr algn="ctr"/>
+            <a:endParaRPr lang="en-US"/>
+          </a:p>
+        </p:txBody>
+      </p:sp>
+      <p:sp>
+        <p:nvSpPr>
+          <p:cNvPr id="13" name="Rectangle 12">
+            <a:extLst>
+              <a:ext uri="{FF2B5EF4-FFF2-40B4-BE49-F238E27FC236}">
+                <a16:creationId xmlns:a16="http://schemas.microsoft.com/office/drawing/2014/main" id="{62423CA5-E2E1-4789-B759-9906C1C94063}"/>
+              </a:ext>
+              <a:ext uri="{C183D7F6-B498-43B3-948B-1728B52AA6E4}">
+                <adec:decorative xmlns:adec="http://schemas.microsoft.com/office/drawing/2017/decorative" val="1"/>
+              </a:ext>
+            </a:extLst>
+          </p:cNvPr>
+          <p:cNvSpPr>
+            <a:spLocks noGrp="1" noRot="1" noChangeAspect="1" noMove="1" noResize="1" noEditPoints="1" noAdjustHandles="1" noChangeArrowheads="1" noChangeShapeType="1" noTextEdit="1"/>
+          </p:cNvSpPr>
+          <p:nvPr>
+            <p:extLst>
+              <p:ext uri="{386F3935-93C4-4BCD-93E2-E3B085C9AB24}">
+                <p16:designElem xmlns:p16="http://schemas.microsoft.com/office/powerpoint/2015/main" val="1"/>
+              </p:ext>
+            </p:extLst>
+          </p:nvPr>
+        </p:nvSpPr>
+        <p:spPr>
+          <a:xfrm>
+            <a:off x="0" y="-3"/>
+            <a:ext cx="4660126" cy="6858000"/>
+          </a:xfrm>
+          <a:prstGeom prst="rect">
+            <a:avLst/>
+          </a:prstGeom>
+          <a:solidFill>
+            <a:schemeClr val="tx2"/>
+          </a:solidFill>
+          <a:ln>
+            <a:noFill/>
+          </a:ln>
+          <a:effectLst/>
+        </p:spPr>
+        <p:style>
+          <a:lnRef idx="1">
+            <a:schemeClr val="accent1"/>
+          </a:lnRef>
+          <a:fillRef idx="3">
+            <a:schemeClr val="accent1"/>
+          </a:fillRef>
+          <a:effectRef idx="2">
+            <a:schemeClr val="accent1"/>
+          </a:effectRef>
+          <a:fontRef idx="minor">
+            <a:schemeClr val="lt1"/>
+          </a:fontRef>
+        </p:style>
+        <p:txBody>
+          <a:bodyPr/>
+          <a:lstStyle/>
+          <a:p>
+            <a:endParaRPr lang="en-US"/>
+          </a:p>
+        </p:txBody>
+      </p:sp>
+      <p:sp>
+        <p:nvSpPr>
+          <p:cNvPr id="15" name="Isosceles Triangle 14">
+            <a:extLst>
+              <a:ext uri="{FF2B5EF4-FFF2-40B4-BE49-F238E27FC236}">
+                <a16:creationId xmlns:a16="http://schemas.microsoft.com/office/drawing/2014/main" id="{73772B81-181F-48B7-8826-4D9686D15DF5}"/>
+              </a:ext>
+              <a:ext uri="{C183D7F6-B498-43B3-948B-1728B52AA6E4}">
+                <adec:decorative xmlns:adec="http://schemas.microsoft.com/office/drawing/2017/decorative" val="1"/>
+              </a:ext>
+            </a:extLst>
+          </p:cNvPr>
+          <p:cNvSpPr>
+            <a:spLocks noGrp="1" noRot="1" noChangeAspect="1" noMove="1" noResize="1" noEditPoints="1" noAdjustHandles="1" noChangeArrowheads="1" noChangeShapeType="1" noTextEdit="1"/>
+          </p:cNvSpPr>
+          <p:nvPr>
+            <p:extLst>
+              <p:ext uri="{386F3935-93C4-4BCD-93E2-E3B085C9AB24}">
+                <p16:designElem xmlns:p16="http://schemas.microsoft.com/office/powerpoint/2015/main" val="1"/>
+              </p:ext>
+            </p:extLst>
+          </p:nvPr>
+        </p:nvSpPr>
+        <p:spPr>
+          <a:xfrm rot="10800000">
+            <a:off x="4660127" y="-3"/>
+            <a:ext cx="1056745" cy="6858001"/>
+          </a:xfrm>
+          <a:prstGeom prst="triangle">
+            <a:avLst>
+              <a:gd name="adj" fmla="val 100000"/>
+            </a:avLst>
+          </a:prstGeom>
+          <a:solidFill>
+            <a:schemeClr val="tx2"/>
+          </a:solidFill>
+          <a:ln>
+            <a:noFill/>
+          </a:ln>
+          <a:effectLst/>
+        </p:spPr>
+        <p:style>
+          <a:lnRef idx="1">
+            <a:schemeClr val="accent1"/>
+          </a:lnRef>
+          <a:fillRef idx="3">
+            <a:schemeClr val="accent1"/>
+          </a:fillRef>
+          <a:effectRef idx="2">
+            <a:schemeClr val="accent1"/>
+          </a:effectRef>
+          <a:fontRef idx="minor">
+            <a:schemeClr val="lt1"/>
+          </a:fontRef>
+        </p:style>
+        <p:txBody>
+          <a:bodyPr/>
+          <a:lstStyle/>
+          <a:p>
+            <a:endParaRPr lang="en-US" dirty="0"/>
+          </a:p>
+        </p:txBody>
+      </p:sp>
+      <p:sp>
+        <p:nvSpPr>
+          <p:cNvPr id="2" name="Title 1">
+            <a:extLst>
+              <a:ext uri="{FF2B5EF4-FFF2-40B4-BE49-F238E27FC236}">
+                <a16:creationId xmlns:a16="http://schemas.microsoft.com/office/drawing/2014/main" id="{62114224-F962-C4DD-2E18-9B52E6AE34F8}"/>
+              </a:ext>
+            </a:extLst>
+          </p:cNvPr>
+          <p:cNvSpPr>
+            <a:spLocks noGrp="1"/>
+          </p:cNvSpPr>
+          <p:nvPr>
+            <p:ph type="title"/>
+          </p:nvPr>
+        </p:nvSpPr>
+        <p:spPr>
+          <a:xfrm>
+            <a:off x="673754" y="643467"/>
+            <a:ext cx="4203045" cy="1375608"/>
+          </a:xfrm>
+        </p:spPr>
+        <p:txBody>
+          <a:bodyPr anchor="ctr">
+            <a:normAutofit/>
+          </a:bodyPr>
+          <a:lstStyle/>
+          <a:p>
+            <a:r>
+              <a:rPr lang="en-US">
+                <a:solidFill>
+                  <a:schemeClr val="bg1"/>
+                </a:solidFill>
+              </a:rPr>
+              <a:t>Anatomy of an Extension</a:t>
+            </a:r>
+          </a:p>
+        </p:txBody>
+      </p:sp>
+      <p:sp>
+        <p:nvSpPr>
+          <p:cNvPr id="8" name="Content Placeholder 7">
+            <a:extLst>
+              <a:ext uri="{FF2B5EF4-FFF2-40B4-BE49-F238E27FC236}">
+                <a16:creationId xmlns:a16="http://schemas.microsoft.com/office/drawing/2014/main" id="{68918236-BF78-3961-68F5-5D71B199C366}"/>
+              </a:ext>
+            </a:extLst>
+          </p:cNvPr>
+          <p:cNvSpPr>
+            <a:spLocks noGrp="1"/>
+          </p:cNvSpPr>
+          <p:nvPr>
+            <p:ph idx="1"/>
+          </p:nvPr>
+        </p:nvSpPr>
+        <p:spPr>
+          <a:xfrm>
+            <a:off x="673754" y="2160590"/>
+            <a:ext cx="3973943" cy="3440110"/>
+          </a:xfrm>
+        </p:spPr>
+        <p:txBody>
+          <a:bodyPr>
+            <a:normAutofit/>
+          </a:bodyPr>
+          <a:lstStyle/>
+          <a:p>
+            <a:r>
+              <a:rPr lang="en-US" dirty="0" err="1">
+                <a:solidFill>
+                  <a:schemeClr val="bg1"/>
+                </a:solidFill>
+              </a:rPr>
+              <a:t>WebJobs</a:t>
+            </a:r>
+            <a:r>
+              <a:rPr lang="en-US" dirty="0">
+                <a:solidFill>
+                  <a:schemeClr val="bg1"/>
+                </a:solidFill>
+              </a:rPr>
+              <a:t> Startup</a:t>
+            </a:r>
+          </a:p>
+          <a:p>
+            <a:pPr lvl="1"/>
+            <a:r>
+              <a:rPr lang="en-US" dirty="0">
+                <a:solidFill>
+                  <a:schemeClr val="bg1"/>
+                </a:solidFill>
+              </a:rPr>
+              <a:t>Registers Services &amp; Extension</a:t>
+            </a:r>
+          </a:p>
+          <a:p>
+            <a:r>
+              <a:rPr lang="en-US" dirty="0">
+                <a:solidFill>
+                  <a:schemeClr val="bg1"/>
+                </a:solidFill>
+              </a:rPr>
+              <a:t>Trigger Provider</a:t>
+            </a:r>
+          </a:p>
+          <a:p>
+            <a:pPr lvl="1"/>
+            <a:r>
+              <a:rPr lang="en-US" dirty="0">
+                <a:solidFill>
+                  <a:schemeClr val="bg1"/>
+                </a:solidFill>
+              </a:rPr>
+              <a:t>Registers function metadata</a:t>
+            </a:r>
+          </a:p>
+          <a:p>
+            <a:r>
+              <a:rPr lang="en-US" dirty="0">
+                <a:solidFill>
+                  <a:schemeClr val="bg1"/>
+                </a:solidFill>
+              </a:rPr>
+              <a:t>Trigger Context Binding</a:t>
+            </a:r>
+          </a:p>
+          <a:p>
+            <a:pPr lvl="1"/>
+            <a:r>
+              <a:rPr lang="en-US" dirty="0">
+                <a:solidFill>
+                  <a:schemeClr val="bg1"/>
+                </a:solidFill>
+              </a:rPr>
+              <a:t>Allows config / service injection</a:t>
+            </a:r>
+          </a:p>
+          <a:p>
+            <a:pPr lvl="1"/>
+            <a:r>
+              <a:rPr lang="en-US" dirty="0">
+                <a:solidFill>
+                  <a:schemeClr val="bg1"/>
+                </a:solidFill>
+              </a:rPr>
+              <a:t>Via Tigger Context class</a:t>
+            </a:r>
+          </a:p>
+          <a:p>
+            <a:r>
+              <a:rPr lang="en-US" dirty="0">
+                <a:solidFill>
+                  <a:schemeClr val="bg1"/>
+                </a:solidFill>
+              </a:rPr>
+              <a:t>Function Implementation</a:t>
+            </a:r>
+          </a:p>
+          <a:p>
+            <a:pPr lvl="1"/>
+            <a:r>
+              <a:rPr lang="en-US" dirty="0">
+                <a:solidFill>
+                  <a:schemeClr val="bg1"/>
+                </a:solidFill>
+              </a:rPr>
+              <a:t>Does the work!</a:t>
+            </a:r>
+          </a:p>
+        </p:txBody>
+      </p:sp>
+      <p:pic>
+        <p:nvPicPr>
+          <p:cNvPr id="4" name="Content Placeholder 3">
+            <a:extLst>
+              <a:ext uri="{FF2B5EF4-FFF2-40B4-BE49-F238E27FC236}">
+                <a16:creationId xmlns:a16="http://schemas.microsoft.com/office/drawing/2014/main" id="{ABAD500D-C551-5A46-B094-1826B96E1ED1}"/>
+              </a:ext>
+            </a:extLst>
+          </p:cNvPr>
+          <p:cNvPicPr>
+            <a:picLocks noChangeAspect="1"/>
+          </p:cNvPicPr>
+          <p:nvPr/>
+        </p:nvPicPr>
+        <p:blipFill>
+          <a:blip r:embed="rId2"/>
+          <a:stretch>
+            <a:fillRect/>
+          </a:stretch>
+        </p:blipFill>
+        <p:spPr>
+          <a:xfrm>
+            <a:off x="5729300" y="186796"/>
+            <a:ext cx="6124857" cy="6171142"/>
+          </a:xfrm>
+          <a:prstGeom prst="rect">
+            <a:avLst/>
+          </a:prstGeom>
+        </p:spPr>
+      </p:pic>
+      <p:sp>
+        <p:nvSpPr>
+          <p:cNvPr id="17" name="Isosceles Triangle 16">
+            <a:extLst>
+              <a:ext uri="{FF2B5EF4-FFF2-40B4-BE49-F238E27FC236}">
+                <a16:creationId xmlns:a16="http://schemas.microsoft.com/office/drawing/2014/main" id="{B2205F6E-03C6-4E92-877C-E2482F6599AA}"/>
+              </a:ext>
+              <a:ext uri="{C183D7F6-B498-43B3-948B-1728B52AA6E4}">
+                <adec:decorative xmlns:adec="http://schemas.microsoft.com/office/drawing/2017/decorative" val="1"/>
+              </a:ext>
+            </a:extLst>
+          </p:cNvPr>
+          <p:cNvSpPr>
+            <a:spLocks noGrp="1" noRot="1" noChangeAspect="1" noMove="1" noResize="1" noEditPoints="1" noAdjustHandles="1" noChangeArrowheads="1" noChangeShapeType="1" noTextEdit="1"/>
+          </p:cNvSpPr>
+          <p:nvPr>
+            <p:extLst>
+              <p:ext uri="{386F3935-93C4-4BCD-93E2-E3B085C9AB24}">
+                <p16:designElem xmlns:p16="http://schemas.microsoft.com/office/powerpoint/2015/main" val="1"/>
+              </p:ext>
+            </p:extLst>
+          </p:nvPr>
+        </p:nvSpPr>
+        <p:spPr>
+          <a:xfrm flipH="1">
+            <a:off x="11755696" y="4013200"/>
+            <a:ext cx="448733" cy="2844800"/>
+          </a:xfrm>
+          <a:prstGeom prst="triangle">
+            <a:avLst>
+              <a:gd name="adj" fmla="val 0"/>
+            </a:avLst>
+          </a:prstGeom>
+          <a:solidFill>
+            <a:schemeClr val="accent1">
+              <a:alpha val="85000"/>
+            </a:schemeClr>
+          </a:solidFill>
+          <a:ln>
+            <a:noFill/>
+          </a:ln>
+          <a:effectLst/>
+        </p:spPr>
+        <p:style>
+          <a:lnRef idx="1">
+            <a:schemeClr val="accent1"/>
+          </a:lnRef>
+          <a:fillRef idx="3">
+            <a:schemeClr val="accent1"/>
+          </a:fillRef>
+          <a:effectRef idx="2">
+            <a:schemeClr val="accent1"/>
+          </a:effectRef>
+          <a:fontRef idx="minor">
+            <a:schemeClr val="lt1"/>
+          </a:fontRef>
+        </p:style>
+        <p:txBody>
+          <a:bodyPr/>
+          <a:lstStyle/>
+          <a:p>
+            <a:endParaRPr lang="en-US" dirty="0"/>
+          </a:p>
+        </p:txBody>
+      </p:sp>
+    </p:spTree>
+    <p:extLst>
+      <p:ext uri="{BB962C8B-B14F-4D97-AF65-F5344CB8AC3E}">
+        <p14:creationId xmlns:p14="http://schemas.microsoft.com/office/powerpoint/2010/main" val="1830812349"/>
+      </p:ext>
+    </p:extLst>
+  </p:cSld>
+  <p:clrMapOvr>
+    <a:masterClrMapping/>
+  </p:clrMapOvr>
+  <p:timing>
+    <p:tnLst>
+      <p:par>
+        <p:cTn id="1" dur="indefinite" restart="never" nodeType="tmRoot">
+          <p:childTnLst>
+            <p:seq concurrent="1" nextAc="seek">
+              <p:cTn id="2" dur="indefinite" nodeType="mainSeq">
+                <p:childTnLst>
+                  <p:par>
+                    <p:cTn id="3" fill="hold">
+                      <p:stCondLst>
+                        <p:cond delay="indefinite"/>
+                      </p:stCondLst>
+                      <p:childTnLst>
+                        <p:par>
+                          <p:cTn id="4" fill="hold">
+                            <p:stCondLst>
+                              <p:cond delay="0"/>
+                            </p:stCondLst>
+                            <p:childTnLst>
+                              <p:par>
+                                <p:cTn id="5" presetID="9" presetClass="entr" presetSubtype="0" fill="hold" nodeType="clickEffect">
+                                  <p:stCondLst>
+                                    <p:cond delay="0"/>
+                                  </p:stCondLst>
+                                  <p:childTnLst>
+                                    <p:set>
+                                      <p:cBhvr>
+                                        <p:cTn id="6" dur="1" fill="hold">
+                                          <p:stCondLst>
+                                            <p:cond delay="0"/>
+                                          </p:stCondLst>
+                                        </p:cTn>
+                                        <p:tgtEl>
+                                          <p:spTgt spid="8">
+                                            <p:txEl>
+                                              <p:pRg st="0" end="0"/>
+                                            </p:txEl>
+                                          </p:spTgt>
+                                        </p:tgtEl>
+                                        <p:attrNameLst>
+                                          <p:attrName>style.visibility</p:attrName>
+                                        </p:attrNameLst>
+                                      </p:cBhvr>
+                                      <p:to>
+                                        <p:strVal val="visible"/>
+                                      </p:to>
+                                    </p:set>
+                                    <p:animEffect transition="in" filter="dissolve">
+                                      <p:cBhvr>
+                                        <p:cTn id="7" dur="500"/>
+                                        <p:tgtEl>
+                                          <p:spTgt spid="8">
+                                            <p:txEl>
+                                              <p:pRg st="0" end="0"/>
+                                            </p:txEl>
+                                          </p:spTgt>
+                                        </p:tgtEl>
+                                      </p:cBhvr>
+                                    </p:animEffect>
+                                  </p:childTnLst>
+                                </p:cTn>
+                              </p:par>
+                            </p:childTnLst>
+                          </p:cTn>
+                        </p:par>
+                        <p:par>
+                          <p:cTn id="8" fill="hold">
+                            <p:stCondLst>
+                              <p:cond delay="500"/>
+                            </p:stCondLst>
+                            <p:childTnLst>
+                              <p:par>
+                                <p:cTn id="9" presetID="9" presetClass="entr" presetSubtype="0" fill="hold" nodeType="afterEffect">
+                                  <p:stCondLst>
+                                    <p:cond delay="0"/>
+                                  </p:stCondLst>
+                                  <p:childTnLst>
+                                    <p:set>
+                                      <p:cBhvr>
+                                        <p:cTn id="10" dur="1" fill="hold">
+                                          <p:stCondLst>
+                                            <p:cond delay="0"/>
+                                          </p:stCondLst>
+                                        </p:cTn>
+                                        <p:tgtEl>
+                                          <p:spTgt spid="8">
+                                            <p:txEl>
+                                              <p:pRg st="1" end="1"/>
+                                            </p:txEl>
+                                          </p:spTgt>
+                                        </p:tgtEl>
+                                        <p:attrNameLst>
+                                          <p:attrName>style.visibility</p:attrName>
+                                        </p:attrNameLst>
+                                      </p:cBhvr>
+                                      <p:to>
+                                        <p:strVal val="visible"/>
+                                      </p:to>
+                                    </p:set>
+                                    <p:animEffect transition="in" filter="dissolve">
+                                      <p:cBhvr>
+                                        <p:cTn id="11" dur="500"/>
+                                        <p:tgtEl>
+                                          <p:spTgt spid="8">
+                                            <p:txEl>
+                                              <p:pRg st="1" end="1"/>
+                                            </p:txEl>
+                                          </p:spTgt>
+                                        </p:tgtEl>
+                                      </p:cBhvr>
+                                    </p:animEffect>
+                                  </p:childTnLst>
+                                </p:cTn>
+                              </p:par>
+                            </p:childTnLst>
+                          </p:cTn>
+                        </p:par>
+                        <p:par>
+                          <p:cTn id="12" fill="hold">
+                            <p:stCondLst>
+                              <p:cond delay="1000"/>
+                            </p:stCondLst>
+                            <p:childTnLst>
+                              <p:par>
+                                <p:cTn id="13" presetID="9" presetClass="entr" presetSubtype="0" fill="hold" nodeType="afterEffect">
+                                  <p:stCondLst>
+                                    <p:cond delay="0"/>
+                                  </p:stCondLst>
+                                  <p:childTnLst>
+                                    <p:set>
+                                      <p:cBhvr>
+                                        <p:cTn id="14" dur="1" fill="hold">
+                                          <p:stCondLst>
+                                            <p:cond delay="0"/>
+                                          </p:stCondLst>
+                                        </p:cTn>
+                                        <p:tgtEl>
+                                          <p:spTgt spid="8">
+                                            <p:txEl>
+                                              <p:pRg st="2" end="2"/>
+                                            </p:txEl>
+                                          </p:spTgt>
+                                        </p:tgtEl>
+                                        <p:attrNameLst>
+                                          <p:attrName>style.visibility</p:attrName>
+                                        </p:attrNameLst>
+                                      </p:cBhvr>
+                                      <p:to>
+                                        <p:strVal val="visible"/>
+                                      </p:to>
+                                    </p:set>
+                                    <p:animEffect transition="in" filter="dissolve">
+                                      <p:cBhvr>
+                                        <p:cTn id="15" dur="500"/>
+                                        <p:tgtEl>
+                                          <p:spTgt spid="8">
+                                            <p:txEl>
+                                              <p:pRg st="2" end="2"/>
+                                            </p:txEl>
+                                          </p:spTgt>
+                                        </p:tgtEl>
+                                      </p:cBhvr>
+                                    </p:animEffect>
+                                  </p:childTnLst>
+                                </p:cTn>
+                              </p:par>
+                            </p:childTnLst>
+                          </p:cTn>
+                        </p:par>
+                        <p:par>
+                          <p:cTn id="16" fill="hold">
+                            <p:stCondLst>
+                              <p:cond delay="1500"/>
+                            </p:stCondLst>
+                            <p:childTnLst>
+                              <p:par>
+                                <p:cTn id="17" presetID="9" presetClass="entr" presetSubtype="0" fill="hold" nodeType="afterEffect">
+                                  <p:stCondLst>
+                                    <p:cond delay="0"/>
+                                  </p:stCondLst>
+                                  <p:childTnLst>
+                                    <p:set>
+                                      <p:cBhvr>
+                                        <p:cTn id="18" dur="1" fill="hold">
+                                          <p:stCondLst>
+                                            <p:cond delay="0"/>
+                                          </p:stCondLst>
+                                        </p:cTn>
+                                        <p:tgtEl>
+                                          <p:spTgt spid="8">
+                                            <p:txEl>
+                                              <p:pRg st="3" end="3"/>
+                                            </p:txEl>
+                                          </p:spTgt>
+                                        </p:tgtEl>
+                                        <p:attrNameLst>
+                                          <p:attrName>style.visibility</p:attrName>
+                                        </p:attrNameLst>
+                                      </p:cBhvr>
+                                      <p:to>
+                                        <p:strVal val="visible"/>
+                                      </p:to>
+                                    </p:set>
+                                    <p:animEffect transition="in" filter="dissolve">
+                                      <p:cBhvr>
+                                        <p:cTn id="19" dur="500"/>
+                                        <p:tgtEl>
+                                          <p:spTgt spid="8">
+                                            <p:txEl>
+                                              <p:pRg st="3" end="3"/>
+                                            </p:txEl>
+                                          </p:spTgt>
+                                        </p:tgtEl>
+                                      </p:cBhvr>
+                                    </p:animEffect>
+                                  </p:childTnLst>
+                                </p:cTn>
+                              </p:par>
+                            </p:childTnLst>
+                          </p:cTn>
+                        </p:par>
+                        <p:par>
+                          <p:cTn id="20" fill="hold">
+                            <p:stCondLst>
+                              <p:cond delay="2000"/>
+                            </p:stCondLst>
+                            <p:childTnLst>
+                              <p:par>
+                                <p:cTn id="21" presetID="9" presetClass="entr" presetSubtype="0" fill="hold" nodeType="afterEffect">
+                                  <p:stCondLst>
+                                    <p:cond delay="0"/>
+                                  </p:stCondLst>
+                                  <p:childTnLst>
+                                    <p:set>
+                                      <p:cBhvr>
+                                        <p:cTn id="22" dur="1" fill="hold">
+                                          <p:stCondLst>
+                                            <p:cond delay="0"/>
+                                          </p:stCondLst>
+                                        </p:cTn>
+                                        <p:tgtEl>
+                                          <p:spTgt spid="8">
+                                            <p:txEl>
+                                              <p:pRg st="4" end="4"/>
+                                            </p:txEl>
+                                          </p:spTgt>
+                                        </p:tgtEl>
+                                        <p:attrNameLst>
+                                          <p:attrName>style.visibility</p:attrName>
+                                        </p:attrNameLst>
+                                      </p:cBhvr>
+                                      <p:to>
+                                        <p:strVal val="visible"/>
+                                      </p:to>
+                                    </p:set>
+                                    <p:animEffect transition="in" filter="dissolve">
+                                      <p:cBhvr>
+                                        <p:cTn id="23" dur="500"/>
+                                        <p:tgtEl>
+                                          <p:spTgt spid="8">
+                                            <p:txEl>
+                                              <p:pRg st="4" end="4"/>
+                                            </p:txEl>
+                                          </p:spTgt>
+                                        </p:tgtEl>
+                                      </p:cBhvr>
+                                    </p:animEffect>
+                                  </p:childTnLst>
+                                </p:cTn>
+                              </p:par>
+                            </p:childTnLst>
+                          </p:cTn>
+                        </p:par>
+                        <p:par>
+                          <p:cTn id="24" fill="hold">
+                            <p:stCondLst>
+                              <p:cond delay="2500"/>
+                            </p:stCondLst>
+                            <p:childTnLst>
+                              <p:par>
+                                <p:cTn id="25" presetID="9" presetClass="entr" presetSubtype="0" fill="hold" nodeType="afterEffect">
+                                  <p:stCondLst>
+                                    <p:cond delay="0"/>
+                                  </p:stCondLst>
+                                  <p:childTnLst>
+                                    <p:set>
+                                      <p:cBhvr>
+                                        <p:cTn id="26" dur="1" fill="hold">
+                                          <p:stCondLst>
+                                            <p:cond delay="0"/>
+                                          </p:stCondLst>
+                                        </p:cTn>
+                                        <p:tgtEl>
+                                          <p:spTgt spid="8">
+                                            <p:txEl>
+                                              <p:pRg st="5" end="5"/>
+                                            </p:txEl>
+                                          </p:spTgt>
+                                        </p:tgtEl>
+                                        <p:attrNameLst>
+                                          <p:attrName>style.visibility</p:attrName>
+                                        </p:attrNameLst>
+                                      </p:cBhvr>
+                                      <p:to>
+                                        <p:strVal val="visible"/>
+                                      </p:to>
+                                    </p:set>
+                                    <p:animEffect transition="in" filter="dissolve">
+                                      <p:cBhvr>
+                                        <p:cTn id="27" dur="500"/>
+                                        <p:tgtEl>
+                                          <p:spTgt spid="8">
+                                            <p:txEl>
+                                              <p:pRg st="5" end="5"/>
+                                            </p:txEl>
+                                          </p:spTgt>
+                                        </p:tgtEl>
+                                      </p:cBhvr>
+                                    </p:animEffect>
+                                  </p:childTnLst>
+                                </p:cTn>
+                              </p:par>
+                            </p:childTnLst>
+                          </p:cTn>
+                        </p:par>
+                        <p:par>
+                          <p:cTn id="28" fill="hold">
+                            <p:stCondLst>
+                              <p:cond delay="3000"/>
+                            </p:stCondLst>
+                            <p:childTnLst>
+                              <p:par>
+                                <p:cTn id="29" presetID="9" presetClass="entr" presetSubtype="0" fill="hold" nodeType="afterEffect">
+                                  <p:stCondLst>
+                                    <p:cond delay="0"/>
+                                  </p:stCondLst>
+                                  <p:childTnLst>
+                                    <p:set>
+                                      <p:cBhvr>
+                                        <p:cTn id="30" dur="1" fill="hold">
+                                          <p:stCondLst>
+                                            <p:cond delay="0"/>
+                                          </p:stCondLst>
+                                        </p:cTn>
+                                        <p:tgtEl>
+                                          <p:spTgt spid="8">
+                                            <p:txEl>
+                                              <p:pRg st="6" end="6"/>
+                                            </p:txEl>
+                                          </p:spTgt>
+                                        </p:tgtEl>
+                                        <p:attrNameLst>
+                                          <p:attrName>style.visibility</p:attrName>
+                                        </p:attrNameLst>
+                                      </p:cBhvr>
+                                      <p:to>
+                                        <p:strVal val="visible"/>
+                                      </p:to>
+                                    </p:set>
+                                    <p:animEffect transition="in" filter="dissolve">
+                                      <p:cBhvr>
+                                        <p:cTn id="31" dur="500"/>
+                                        <p:tgtEl>
+                                          <p:spTgt spid="8">
+                                            <p:txEl>
+                                              <p:pRg st="6" end="6"/>
+                                            </p:txEl>
+                                          </p:spTgt>
+                                        </p:tgtEl>
+                                      </p:cBhvr>
+                                    </p:animEffect>
+                                  </p:childTnLst>
+                                </p:cTn>
+                              </p:par>
+                            </p:childTnLst>
+                          </p:cTn>
+                        </p:par>
+                        <p:par>
+                          <p:cTn id="32" fill="hold">
+                            <p:stCondLst>
+                              <p:cond delay="3500"/>
+                            </p:stCondLst>
+                            <p:childTnLst>
+                              <p:par>
+                                <p:cTn id="33" presetID="9" presetClass="entr" presetSubtype="0" fill="hold" nodeType="afterEffect">
+                                  <p:stCondLst>
+                                    <p:cond delay="0"/>
+                                  </p:stCondLst>
+                                  <p:childTnLst>
+                                    <p:set>
+                                      <p:cBhvr>
+                                        <p:cTn id="34" dur="1" fill="hold">
+                                          <p:stCondLst>
+                                            <p:cond delay="0"/>
+                                          </p:stCondLst>
+                                        </p:cTn>
+                                        <p:tgtEl>
+                                          <p:spTgt spid="8">
+                                            <p:txEl>
+                                              <p:pRg st="7" end="7"/>
+                                            </p:txEl>
+                                          </p:spTgt>
+                                        </p:tgtEl>
+                                        <p:attrNameLst>
+                                          <p:attrName>style.visibility</p:attrName>
+                                        </p:attrNameLst>
+                                      </p:cBhvr>
+                                      <p:to>
+                                        <p:strVal val="visible"/>
+                                      </p:to>
+                                    </p:set>
+                                    <p:animEffect transition="in" filter="dissolve">
+                                      <p:cBhvr>
+                                        <p:cTn id="35" dur="500"/>
+                                        <p:tgtEl>
+                                          <p:spTgt spid="8">
+                                            <p:txEl>
+                                              <p:pRg st="7" end="7"/>
+                                            </p:txEl>
+                                          </p:spTgt>
+                                        </p:tgtEl>
+                                      </p:cBhvr>
+                                    </p:animEffect>
+                                  </p:childTnLst>
+                                </p:cTn>
+                              </p:par>
+                            </p:childTnLst>
+                          </p:cTn>
+                        </p:par>
+                        <p:par>
+                          <p:cTn id="36" fill="hold">
+                            <p:stCondLst>
+                              <p:cond delay="4000"/>
+                            </p:stCondLst>
+                            <p:childTnLst>
+                              <p:par>
+                                <p:cTn id="37" presetID="9" presetClass="entr" presetSubtype="0" fill="hold" nodeType="afterEffect">
+                                  <p:stCondLst>
+                                    <p:cond delay="0"/>
+                                  </p:stCondLst>
+                                  <p:childTnLst>
+                                    <p:set>
+                                      <p:cBhvr>
+                                        <p:cTn id="38" dur="1" fill="hold">
+                                          <p:stCondLst>
+                                            <p:cond delay="0"/>
+                                          </p:stCondLst>
+                                        </p:cTn>
+                                        <p:tgtEl>
+                                          <p:spTgt spid="8">
+                                            <p:txEl>
+                                              <p:pRg st="8" end="8"/>
+                                            </p:txEl>
+                                          </p:spTgt>
+                                        </p:tgtEl>
+                                        <p:attrNameLst>
+                                          <p:attrName>style.visibility</p:attrName>
+                                        </p:attrNameLst>
+                                      </p:cBhvr>
+                                      <p:to>
+                                        <p:strVal val="visible"/>
+                                      </p:to>
+                                    </p:set>
+                                    <p:animEffect transition="in" filter="dissolve">
+                                      <p:cBhvr>
+                                        <p:cTn id="39" dur="500"/>
+                                        <p:tgtEl>
+                                          <p:spTgt spid="8">
+                                            <p:txEl>
+                                              <p:pRg st="8" end="8"/>
+                                            </p:txEl>
+                                          </p:spTgt>
+                                        </p:tgtEl>
+                                      </p:cBhvr>
+                                    </p:animEffect>
+                                  </p:childTnLst>
+                                </p:cTn>
+                              </p:par>
+                            </p:childTnLst>
+                          </p:cTn>
+                        </p:par>
+                      </p:childTnLst>
+                    </p:cTn>
+                  </p:par>
+                </p:childTnLst>
+              </p:cTn>
+              <p:prevCondLst>
+                <p:cond evt="onPrev" delay="0">
+                  <p:tgtEl>
+                    <p:sldTgt/>
+                  </p:tgtEl>
+                </p:cond>
+              </p:prevCondLst>
+              <p:nextCondLst>
+                <p:cond evt="onNext" delay="0">
+                  <p:tgtEl>
+                    <p:sldTgt/>
+                  </p:tgtEl>
+                </p:cond>
+              </p:nextCondLst>
+            </p:seq>
+          </p:childTnLst>
+        </p:cTn>
+      </p:par>
+    </p:tnLst>
+  </p:timing>
 </p:sld>
 </file>
 

</xml_diff>

<commit_message>
Updated PPTX, plus minor code cleanups
</commit_message>
<xml_diff>
--- a/Global Azure London - 2023-05-12.pptx
+++ b/Global Azure London - 2023-05-12.pptx
@@ -10,6 +10,7 @@
     <p:sldId id="258" r:id="rId4"/>
     <p:sldId id="259" r:id="rId5"/>
     <p:sldId id="260" r:id="rId6"/>
+    <p:sldId id="261" r:id="rId7"/>
   </p:sldIdLst>
   <p:sldSz cx="12192000" cy="6858000"/>
   <p:notesSz cx="6858000" cy="9144000"/>
@@ -108,6 +109,11 @@
       </a:defRPr>
     </a:lvl9pPr>
   </p:defaultTextStyle>
+  <p:extLst>
+    <p:ext uri="{EFAFB233-063F-42B5-8137-9DF3F51BA10A}">
+      <p15:sldGuideLst xmlns:p15="http://schemas.microsoft.com/office/powerpoint/2012/main"/>
+    </p:ext>
+  </p:extLst>
 </p:presentation>
 </file>
 
@@ -833,7 +839,7 @@
           <a:p>
             <a:fld id="{48A87A34-81AB-432B-8DAE-1953F412C126}" type="datetimeFigureOut">
               <a:rPr lang="en-US" smtClean="0"/>
-              <a:t>5/1/23</a:t>
+              <a:t>5/5/2023</a:t>
             </a:fld>
             <a:endParaRPr lang="en-US" dirty="0"/>
           </a:p>
@@ -1085,7 +1091,7 @@
             <a:fld id="{48A87A34-81AB-432B-8DAE-1953F412C126}" type="datetimeFigureOut">
               <a:rPr lang="en-US" smtClean="0"/>
               <a:pPr/>
-              <a:t>5/1/23</a:t>
+              <a:t>5/5/2023</a:t>
             </a:fld>
             <a:endParaRPr lang="en-US" dirty="0"/>
           </a:p>
@@ -1401,7 +1407,7 @@
             <a:fld id="{48A87A34-81AB-432B-8DAE-1953F412C126}" type="datetimeFigureOut">
               <a:rPr lang="en-US" smtClean="0"/>
               <a:pPr/>
-              <a:t>5/1/23</a:t>
+              <a:t>5/5/2023</a:t>
             </a:fld>
             <a:endParaRPr lang="en-US" dirty="0"/>
           </a:p>
@@ -1744,7 +1750,7 @@
             <a:fld id="{48A87A34-81AB-432B-8DAE-1953F412C126}" type="datetimeFigureOut">
               <a:rPr lang="en-US" smtClean="0"/>
               <a:pPr/>
-              <a:t>5/1/23</a:t>
+              <a:t>5/5/2023</a:t>
             </a:fld>
             <a:endParaRPr lang="en-US" dirty="0"/>
           </a:p>
@@ -2060,7 +2066,7 @@
             <a:fld id="{48A87A34-81AB-432B-8DAE-1953F412C126}" type="datetimeFigureOut">
               <a:rPr lang="en-US" smtClean="0"/>
               <a:pPr/>
-              <a:t>5/1/23</a:t>
+              <a:t>5/5/2023</a:t>
             </a:fld>
             <a:endParaRPr lang="en-US" dirty="0"/>
           </a:p>
@@ -2455,7 +2461,7 @@
             <a:fld id="{48A87A34-81AB-432B-8DAE-1953F412C126}" type="datetimeFigureOut">
               <a:rPr lang="en-US" smtClean="0"/>
               <a:pPr/>
-              <a:t>5/1/23</a:t>
+              <a:t>5/5/2023</a:t>
             </a:fld>
             <a:endParaRPr lang="en-US" dirty="0"/>
           </a:p>
@@ -2626,7 +2632,7 @@
           <a:p>
             <a:fld id="{48A87A34-81AB-432B-8DAE-1953F412C126}" type="datetimeFigureOut">
               <a:rPr lang="en-US" smtClean="0"/>
-              <a:t>5/1/23</a:t>
+              <a:t>5/5/2023</a:t>
             </a:fld>
             <a:endParaRPr lang="en-US" dirty="0"/>
           </a:p>
@@ -2806,7 +2812,7 @@
           <a:p>
             <a:fld id="{48A87A34-81AB-432B-8DAE-1953F412C126}" type="datetimeFigureOut">
               <a:rPr lang="en-US" smtClean="0"/>
-              <a:t>5/1/23</a:t>
+              <a:t>5/5/2023</a:t>
             </a:fld>
             <a:endParaRPr lang="en-US" dirty="0"/>
           </a:p>
@@ -2982,7 +2988,7 @@
           <a:p>
             <a:fld id="{48A87A34-81AB-432B-8DAE-1953F412C126}" type="datetimeFigureOut">
               <a:rPr lang="en-US" smtClean="0"/>
-              <a:t>5/1/23</a:t>
+              <a:t>5/5/2023</a:t>
             </a:fld>
             <a:endParaRPr lang="en-US" dirty="0"/>
           </a:p>
@@ -3229,7 +3235,7 @@
           <a:p>
             <a:fld id="{48A87A34-81AB-432B-8DAE-1953F412C126}" type="datetimeFigureOut">
               <a:rPr lang="en-US" smtClean="0"/>
-              <a:t>5/1/23</a:t>
+              <a:t>5/5/2023</a:t>
             </a:fld>
             <a:endParaRPr lang="en-US" dirty="0"/>
           </a:p>
@@ -3461,7 +3467,7 @@
           <a:p>
             <a:fld id="{48A87A34-81AB-432B-8DAE-1953F412C126}" type="datetimeFigureOut">
               <a:rPr lang="en-US" smtClean="0"/>
-              <a:t>5/1/23</a:t>
+              <a:t>5/5/2023</a:t>
             </a:fld>
             <a:endParaRPr lang="en-US" dirty="0"/>
           </a:p>
@@ -3835,7 +3841,7 @@
           <a:p>
             <a:fld id="{48A87A34-81AB-432B-8DAE-1953F412C126}" type="datetimeFigureOut">
               <a:rPr lang="en-US" smtClean="0"/>
-              <a:t>5/1/23</a:t>
+              <a:t>5/5/2023</a:t>
             </a:fld>
             <a:endParaRPr lang="en-US" dirty="0"/>
           </a:p>
@@ -3958,7 +3964,7 @@
           <a:p>
             <a:fld id="{48A87A34-81AB-432B-8DAE-1953F412C126}" type="datetimeFigureOut">
               <a:rPr lang="en-US" smtClean="0"/>
-              <a:t>5/1/23</a:t>
+              <a:t>5/5/2023</a:t>
             </a:fld>
             <a:endParaRPr lang="en-US" dirty="0"/>
           </a:p>
@@ -4053,7 +4059,7 @@
           <a:p>
             <a:fld id="{48A87A34-81AB-432B-8DAE-1953F412C126}" type="datetimeFigureOut">
               <a:rPr lang="en-US" smtClean="0"/>
-              <a:t>5/1/23</a:t>
+              <a:t>5/5/2023</a:t>
             </a:fld>
             <a:endParaRPr lang="en-US" dirty="0"/>
           </a:p>
@@ -4308,7 +4314,7 @@
           <a:p>
             <a:fld id="{48A87A34-81AB-432B-8DAE-1953F412C126}" type="datetimeFigureOut">
               <a:rPr lang="en-US" smtClean="0"/>
-              <a:t>5/1/23</a:t>
+              <a:t>5/5/2023</a:t>
             </a:fld>
             <a:endParaRPr lang="en-US" dirty="0"/>
           </a:p>
@@ -4571,7 +4577,7 @@
           <a:p>
             <a:fld id="{48A87A34-81AB-432B-8DAE-1953F412C126}" type="datetimeFigureOut">
               <a:rPr lang="en-US" smtClean="0"/>
-              <a:t>5/1/23</a:t>
+              <a:t>5/5/2023</a:t>
             </a:fld>
             <a:endParaRPr lang="en-US" dirty="0"/>
           </a:p>
@@ -5315,7 +5321,7 @@
             <a:fld id="{48A87A34-81AB-432B-8DAE-1953F412C126}" type="datetimeFigureOut">
               <a:rPr lang="en-US" smtClean="0"/>
               <a:pPr/>
-              <a:t>5/1/23</a:t>
+              <a:t>5/5/2023</a:t>
             </a:fld>
             <a:endParaRPr lang="en-US" dirty="0"/>
           </a:p>
@@ -8258,21 +8264,30 @@
                             </p:childTnLst>
                           </p:cTn>
                         </p:par>
+                      </p:childTnLst>
+                    </p:cTn>
+                  </p:par>
+                  <p:par>
+                    <p:cTn id="12" fill="hold">
+                      <p:stCondLst>
+                        <p:cond delay="indefinite"/>
+                      </p:stCondLst>
+                      <p:childTnLst>
                         <p:par>
-                          <p:cTn id="12" fill="hold">
+                          <p:cTn id="13" fill="hold">
                             <p:stCondLst>
-                              <p:cond delay="1000"/>
+                              <p:cond delay="0"/>
                             </p:stCondLst>
                             <p:childTnLst>
                               <p:par>
-                                <p:cTn id="13" presetID="9" presetClass="entr" presetSubtype="0" fill="hold" nodeType="afterEffect">
+                                <p:cTn id="14" presetID="9" presetClass="entr" presetSubtype="0" fill="hold" nodeType="clickEffect">
                                   <p:stCondLst>
                                     <p:cond delay="0"/>
                                   </p:stCondLst>
                                   <p:childTnLst>
                                     <p:set>
                                       <p:cBhvr>
-                                        <p:cTn id="14" dur="1" fill="hold">
+                                        <p:cTn id="15" dur="1" fill="hold">
                                           <p:stCondLst>
                                             <p:cond delay="0"/>
                                           </p:stCondLst>
@@ -8294,7 +8309,7 @@
                                     </p:set>
                                     <p:animEffect transition="in" filter="dissolve">
                                       <p:cBhvr>
-                                        <p:cTn id="15" dur="500"/>
+                                        <p:cTn id="16" dur="500"/>
                                         <p:tgtEl>
                                           <p:spTgt spid="8">
                                             <p:txEl>
@@ -8311,20 +8326,20 @@
                           </p:cTn>
                         </p:par>
                         <p:par>
-                          <p:cTn id="16" fill="hold">
+                          <p:cTn id="17" fill="hold">
                             <p:stCondLst>
-                              <p:cond delay="1500"/>
+                              <p:cond delay="500"/>
                             </p:stCondLst>
                             <p:childTnLst>
                               <p:par>
-                                <p:cTn id="17" presetID="9" presetClass="entr" presetSubtype="0" fill="hold" nodeType="afterEffect">
+                                <p:cTn id="18" presetID="9" presetClass="entr" presetSubtype="0" fill="hold" nodeType="afterEffect">
                                   <p:stCondLst>
                                     <p:cond delay="0"/>
                                   </p:stCondLst>
                                   <p:childTnLst>
                                     <p:set>
                                       <p:cBhvr>
-                                        <p:cTn id="18" dur="1" fill="hold">
+                                        <p:cTn id="19" dur="1" fill="hold">
                                           <p:stCondLst>
                                             <p:cond delay="0"/>
                                           </p:stCondLst>
@@ -8346,7 +8361,7 @@
                                     </p:set>
                                     <p:animEffect transition="in" filter="dissolve">
                                       <p:cBhvr>
-                                        <p:cTn id="19" dur="500"/>
+                                        <p:cTn id="20" dur="500"/>
                                         <p:tgtEl>
                                           <p:spTgt spid="8">
                                             <p:txEl>
@@ -8362,21 +8377,30 @@
                             </p:childTnLst>
                           </p:cTn>
                         </p:par>
+                      </p:childTnLst>
+                    </p:cTn>
+                  </p:par>
+                  <p:par>
+                    <p:cTn id="21" fill="hold">
+                      <p:stCondLst>
+                        <p:cond delay="indefinite"/>
+                      </p:stCondLst>
+                      <p:childTnLst>
                         <p:par>
-                          <p:cTn id="20" fill="hold">
+                          <p:cTn id="22" fill="hold">
                             <p:stCondLst>
-                              <p:cond delay="2000"/>
+                              <p:cond delay="0"/>
                             </p:stCondLst>
                             <p:childTnLst>
                               <p:par>
-                                <p:cTn id="21" presetID="9" presetClass="entr" presetSubtype="0" fill="hold" nodeType="afterEffect">
+                                <p:cTn id="23" presetID="9" presetClass="entr" presetSubtype="0" fill="hold" nodeType="clickEffect">
                                   <p:stCondLst>
                                     <p:cond delay="0"/>
                                   </p:stCondLst>
                                   <p:childTnLst>
                                     <p:set>
                                       <p:cBhvr>
-                                        <p:cTn id="22" dur="1" fill="hold">
+                                        <p:cTn id="24" dur="1" fill="hold">
                                           <p:stCondLst>
                                             <p:cond delay="0"/>
                                           </p:stCondLst>
@@ -8398,7 +8422,7 @@
                                     </p:set>
                                     <p:animEffect transition="in" filter="dissolve">
                                       <p:cBhvr>
-                                        <p:cTn id="23" dur="500"/>
+                                        <p:cTn id="25" dur="500"/>
                                         <p:tgtEl>
                                           <p:spTgt spid="8">
                                             <p:txEl>
@@ -8415,20 +8439,20 @@
                           </p:cTn>
                         </p:par>
                         <p:par>
-                          <p:cTn id="24" fill="hold">
+                          <p:cTn id="26" fill="hold">
                             <p:stCondLst>
-                              <p:cond delay="2500"/>
+                              <p:cond delay="500"/>
                             </p:stCondLst>
                             <p:childTnLst>
                               <p:par>
-                                <p:cTn id="25" presetID="9" presetClass="entr" presetSubtype="0" fill="hold" nodeType="afterEffect">
+                                <p:cTn id="27" presetID="9" presetClass="entr" presetSubtype="0" fill="hold" nodeType="afterEffect">
                                   <p:stCondLst>
                                     <p:cond delay="0"/>
                                   </p:stCondLst>
                                   <p:childTnLst>
                                     <p:set>
                                       <p:cBhvr>
-                                        <p:cTn id="26" dur="1" fill="hold">
+                                        <p:cTn id="28" dur="1" fill="hold">
                                           <p:stCondLst>
                                             <p:cond delay="0"/>
                                           </p:stCondLst>
@@ -8450,7 +8474,7 @@
                                     </p:set>
                                     <p:animEffect transition="in" filter="dissolve">
                                       <p:cBhvr>
-                                        <p:cTn id="27" dur="500"/>
+                                        <p:cTn id="29" dur="500"/>
                                         <p:tgtEl>
                                           <p:spTgt spid="8">
                                             <p:txEl>
@@ -8467,20 +8491,20 @@
                           </p:cTn>
                         </p:par>
                         <p:par>
-                          <p:cTn id="28" fill="hold">
+                          <p:cTn id="30" fill="hold">
                             <p:stCondLst>
-                              <p:cond delay="3000"/>
+                              <p:cond delay="1000"/>
                             </p:stCondLst>
                             <p:childTnLst>
                               <p:par>
-                                <p:cTn id="29" presetID="9" presetClass="entr" presetSubtype="0" fill="hold" nodeType="afterEffect">
+                                <p:cTn id="31" presetID="9" presetClass="entr" presetSubtype="0" fill="hold" nodeType="afterEffect">
                                   <p:stCondLst>
                                     <p:cond delay="0"/>
                                   </p:stCondLst>
                                   <p:childTnLst>
                                     <p:set>
                                       <p:cBhvr>
-                                        <p:cTn id="30" dur="1" fill="hold">
+                                        <p:cTn id="32" dur="1" fill="hold">
                                           <p:stCondLst>
                                             <p:cond delay="0"/>
                                           </p:stCondLst>
@@ -8502,7 +8526,7 @@
                                     </p:set>
                                     <p:animEffect transition="in" filter="dissolve">
                                       <p:cBhvr>
-                                        <p:cTn id="31" dur="500"/>
+                                        <p:cTn id="33" dur="500"/>
                                         <p:tgtEl>
                                           <p:spTgt spid="8">
                                             <p:txEl>
@@ -8518,21 +8542,30 @@
                             </p:childTnLst>
                           </p:cTn>
                         </p:par>
+                      </p:childTnLst>
+                    </p:cTn>
+                  </p:par>
+                  <p:par>
+                    <p:cTn id="34" fill="hold">
+                      <p:stCondLst>
+                        <p:cond delay="indefinite"/>
+                      </p:stCondLst>
+                      <p:childTnLst>
                         <p:par>
-                          <p:cTn id="32" fill="hold">
+                          <p:cTn id="35" fill="hold">
                             <p:stCondLst>
-                              <p:cond delay="3500"/>
+                              <p:cond delay="0"/>
                             </p:stCondLst>
                             <p:childTnLst>
                               <p:par>
-                                <p:cTn id="33" presetID="9" presetClass="entr" presetSubtype="0" fill="hold" nodeType="afterEffect">
+                                <p:cTn id="36" presetID="9" presetClass="entr" presetSubtype="0" fill="hold" nodeType="clickEffect">
                                   <p:stCondLst>
                                     <p:cond delay="0"/>
                                   </p:stCondLst>
                                   <p:childTnLst>
                                     <p:set>
                                       <p:cBhvr>
-                                        <p:cTn id="34" dur="1" fill="hold">
+                                        <p:cTn id="37" dur="1" fill="hold">
                                           <p:stCondLst>
                                             <p:cond delay="0"/>
                                           </p:stCondLst>
@@ -8554,7 +8587,7 @@
                                     </p:set>
                                     <p:animEffect transition="in" filter="dissolve">
                                       <p:cBhvr>
-                                        <p:cTn id="35" dur="500"/>
+                                        <p:cTn id="38" dur="500"/>
                                         <p:tgtEl>
                                           <p:spTgt spid="8">
                                             <p:txEl>
@@ -8571,20 +8604,20 @@
                           </p:cTn>
                         </p:par>
                         <p:par>
-                          <p:cTn id="36" fill="hold">
+                          <p:cTn id="39" fill="hold">
                             <p:stCondLst>
-                              <p:cond delay="4000"/>
+                              <p:cond delay="500"/>
                             </p:stCondLst>
                             <p:childTnLst>
                               <p:par>
-                                <p:cTn id="37" presetID="9" presetClass="entr" presetSubtype="0" fill="hold" nodeType="afterEffect">
+                                <p:cTn id="40" presetID="9" presetClass="entr" presetSubtype="0" fill="hold" nodeType="afterEffect">
                                   <p:stCondLst>
                                     <p:cond delay="0"/>
                                   </p:stCondLst>
                                   <p:childTnLst>
                                     <p:set>
                                       <p:cBhvr>
-                                        <p:cTn id="38" dur="1" fill="hold">
+                                        <p:cTn id="41" dur="1" fill="hold">
                                           <p:stCondLst>
                                             <p:cond delay="0"/>
                                           </p:stCondLst>
@@ -8606,13 +8639,281 @@
                                     </p:set>
                                     <p:animEffect transition="in" filter="dissolve">
                                       <p:cBhvr>
-                                        <p:cTn id="39" dur="500"/>
+                                        <p:cTn id="42" dur="500"/>
                                         <p:tgtEl>
                                           <p:spTgt spid="8">
                                             <p:txEl>
                                               <p:pRg st="8" end="8"/>
                                             </p:txEl>
                                           </p:spTgt>
+                                        </p:tgtEl>
+                                      </p:cBhvr>
+                                    </p:animEffect>
+                                  </p:childTnLst>
+                                </p:cTn>
+                              </p:par>
+                            </p:childTnLst>
+                          </p:cTn>
+                        </p:par>
+                      </p:childTnLst>
+                    </p:cTn>
+                  </p:par>
+                </p:childTnLst>
+              </p:cTn>
+              <p:prevCondLst>
+                <p:cond evt="onPrev" delay="0">
+                  <p:tgtEl>
+                    <p:sldTgt/>
+                  </p:tgtEl>
+                </p:cond>
+              </p:prevCondLst>
+              <p:nextCondLst>
+                <p:cond evt="onNext" delay="0">
+                  <p:tgtEl>
+                    <p:sldTgt/>
+                  </p:tgtEl>
+                </p:cond>
+              </p:nextCondLst>
+            </p:seq>
+          </p:childTnLst>
+        </p:cTn>
+      </p:par>
+    </p:tnLst>
+  </p:timing>
+</p:sld>
+</file>
+
+<file path=ppt/slides/slide6.xml><?xml version="1.0" encoding="utf-8"?>
+<p:sld xmlns:a="http://schemas.openxmlformats.org/drawingml/2006/main" xmlns:r="http://schemas.openxmlformats.org/officeDocument/2006/relationships" xmlns:p="http://schemas.openxmlformats.org/presentationml/2006/main">
+  <p:cSld>
+    <p:spTree>
+      <p:nvGrpSpPr>
+        <p:cNvPr id="1" name=""/>
+        <p:cNvGrpSpPr/>
+        <p:nvPr/>
+      </p:nvGrpSpPr>
+      <p:grpSpPr>
+        <a:xfrm>
+          <a:off x="0" y="0"/>
+          <a:ext cx="0" cy="0"/>
+          <a:chOff x="0" y="0"/>
+          <a:chExt cx="0" cy="0"/>
+        </a:xfrm>
+      </p:grpSpPr>
+      <p:sp>
+        <p:nvSpPr>
+          <p:cNvPr id="2" name="Title 1">
+            <a:extLst>
+              <a:ext uri="{FF2B5EF4-FFF2-40B4-BE49-F238E27FC236}">
+                <a16:creationId xmlns:a16="http://schemas.microsoft.com/office/drawing/2014/main" id="{AA3186D4-3D04-A195-072B-364848ACA4CA}"/>
+              </a:ext>
+            </a:extLst>
+          </p:cNvPr>
+          <p:cNvSpPr>
+            <a:spLocks noGrp="1"/>
+          </p:cNvSpPr>
+          <p:nvPr>
+            <p:ph type="title"/>
+          </p:nvPr>
+        </p:nvSpPr>
+        <p:spPr/>
+        <p:txBody>
+          <a:bodyPr/>
+          <a:lstStyle/>
+          <a:p>
+            <a:r>
+              <a:rPr lang="en-US" dirty="0"/>
+              <a:t>Azure Function App</a:t>
+            </a:r>
+          </a:p>
+        </p:txBody>
+      </p:sp>
+      <p:sp>
+        <p:nvSpPr>
+          <p:cNvPr id="3" name="Content Placeholder 2">
+            <a:extLst>
+              <a:ext uri="{FF2B5EF4-FFF2-40B4-BE49-F238E27FC236}">
+                <a16:creationId xmlns:a16="http://schemas.microsoft.com/office/drawing/2014/main" id="{8FC83EEB-EFAA-B895-4D5D-B881228B78B3}"/>
+              </a:ext>
+            </a:extLst>
+          </p:cNvPr>
+          <p:cNvSpPr>
+            <a:spLocks noGrp="1"/>
+          </p:cNvSpPr>
+          <p:nvPr>
+            <p:ph idx="1"/>
+          </p:nvPr>
+        </p:nvSpPr>
+        <p:spPr/>
+        <p:txBody>
+          <a:bodyPr/>
+          <a:lstStyle/>
+          <a:p>
+            <a:r>
+              <a:rPr lang="en-US" dirty="0"/>
+              <a:t>To add the standard health endpoint</a:t>
+            </a:r>
+          </a:p>
+          <a:p>
+            <a:endParaRPr lang="en-US" dirty="0"/>
+          </a:p>
+          <a:p>
+            <a:endParaRPr lang="en-US" dirty="0"/>
+          </a:p>
+          <a:p>
+            <a:endParaRPr lang="en-US" dirty="0"/>
+          </a:p>
+          <a:p>
+            <a:endParaRPr lang="en-US" dirty="0"/>
+          </a:p>
+          <a:p>
+            <a:endParaRPr lang="en-US" dirty="0"/>
+          </a:p>
+          <a:p>
+            <a:r>
+              <a:rPr lang="en-US" dirty="0"/>
+              <a:t>Then add health checks</a:t>
+            </a:r>
+          </a:p>
+        </p:txBody>
+      </p:sp>
+      <p:pic>
+        <p:nvPicPr>
+          <p:cNvPr id="4" name="Picture 3">
+            <a:extLst>
+              <a:ext uri="{FF2B5EF4-FFF2-40B4-BE49-F238E27FC236}">
+                <a16:creationId xmlns:a16="http://schemas.microsoft.com/office/drawing/2014/main" id="{D605613A-C58E-F064-5633-B20F00B7CB0F}"/>
+              </a:ext>
+            </a:extLst>
+          </p:cNvPr>
+          <p:cNvPicPr>
+            <a:picLocks noChangeAspect="1"/>
+          </p:cNvPicPr>
+          <p:nvPr/>
+        </p:nvPicPr>
+        <p:blipFill>
+          <a:blip r:embed="rId2"/>
+          <a:srcRect/>
+          <a:stretch/>
+        </p:blipFill>
+        <p:spPr>
+          <a:xfrm>
+            <a:off x="1089468" y="2865644"/>
+            <a:ext cx="7772400" cy="1126711"/>
+          </a:xfrm>
+          <a:prstGeom prst="rect">
+            <a:avLst/>
+          </a:prstGeom>
+          <a:ln>
+            <a:noFill/>
+          </a:ln>
+          <a:effectLst>
+            <a:outerShdw blurRad="190500" algn="tl" rotWithShape="0">
+              <a:srgbClr val="000000">
+                <a:alpha val="70000"/>
+              </a:srgbClr>
+            </a:outerShdw>
+          </a:effectLst>
+        </p:spPr>
+      </p:pic>
+      <p:pic>
+        <p:nvPicPr>
+          <p:cNvPr id="5" name="Picture 4">
+            <a:extLst>
+              <a:ext uri="{FF2B5EF4-FFF2-40B4-BE49-F238E27FC236}">
+                <a16:creationId xmlns:a16="http://schemas.microsoft.com/office/drawing/2014/main" id="{FE768E1A-C028-0C0C-B3D1-75A01F297D68}"/>
+              </a:ext>
+            </a:extLst>
+          </p:cNvPr>
+          <p:cNvPicPr>
+            <a:picLocks noChangeAspect="1"/>
+          </p:cNvPicPr>
+          <p:nvPr/>
+        </p:nvPicPr>
+        <p:blipFill rotWithShape="1">
+          <a:blip r:embed="rId3"/>
+          <a:srcRect l="2451" t="2784" r="1593" b="3097"/>
+          <a:stretch/>
+        </p:blipFill>
+        <p:spPr>
+          <a:xfrm>
+            <a:off x="5807886" y="3282255"/>
+            <a:ext cx="5706780" cy="3290691"/>
+          </a:xfrm>
+          <a:prstGeom prst="rect">
+            <a:avLst/>
+          </a:prstGeom>
+          <a:ln>
+            <a:noFill/>
+          </a:ln>
+          <a:effectLst>
+            <a:outerShdw blurRad="190500" algn="tl" rotWithShape="0">
+              <a:srgbClr val="000000">
+                <a:alpha val="70000"/>
+              </a:srgbClr>
+            </a:outerShdw>
+          </a:effectLst>
+        </p:spPr>
+      </p:pic>
+    </p:spTree>
+    <p:extLst>
+      <p:ext uri="{BB962C8B-B14F-4D97-AF65-F5344CB8AC3E}">
+        <p14:creationId xmlns:p14="http://schemas.microsoft.com/office/powerpoint/2010/main" val="2050400835"/>
+      </p:ext>
+    </p:extLst>
+  </p:cSld>
+  <p:clrMapOvr>
+    <a:masterClrMapping/>
+  </p:clrMapOvr>
+  <p:timing>
+    <p:tnLst>
+      <p:par>
+        <p:cTn id="1" dur="indefinite" restart="never" nodeType="tmRoot">
+          <p:childTnLst>
+            <p:seq concurrent="1" nextAc="seek">
+              <p:cTn id="2" dur="indefinite" nodeType="mainSeq">
+                <p:childTnLst>
+                  <p:par>
+                    <p:cTn id="3" fill="hold">
+                      <p:stCondLst>
+                        <p:cond delay="indefinite"/>
+                      </p:stCondLst>
+                      <p:childTnLst>
+                        <p:par>
+                          <p:cTn id="4" fill="hold">
+                            <p:stCondLst>
+                              <p:cond delay="0"/>
+                            </p:stCondLst>
+                            <p:childTnLst>
+                              <p:par>
+                                <p:cTn id="5" presetID="9" presetClass="entr" presetSubtype="0" fill="hold" nodeType="clickEffect">
+                                  <p:stCondLst>
+                                    <p:cond delay="0"/>
+                                  </p:stCondLst>
+                                  <p:childTnLst>
+                                    <p:set>
+                                      <p:cBhvr>
+                                        <p:cTn id="6" dur="1" fill="hold">
+                                          <p:stCondLst>
+                                            <p:cond delay="0"/>
+                                          </p:stCondLst>
+                                        </p:cTn>
+                                        <p:tgtEl>
+                                          <p:spTgt spid="5"/>
+                                        </p:tgtEl>
+                                        <p:attrNameLst>
+                                          <p:attrName>style.visibility</p:attrName>
+                                        </p:attrNameLst>
+                                      </p:cBhvr>
+                                      <p:to>
+                                        <p:strVal val="visible"/>
+                                      </p:to>
+                                    </p:set>
+                                    <p:animEffect transition="in" filter="dissolve">
+                                      <p:cBhvr>
+                                        <p:cTn id="7" dur="500"/>
+                                        <p:tgtEl>
+                                          <p:spTgt spid="5"/>
                                         </p:tgtEl>
                                       </p:cBhvr>
                                     </p:animEffect>

</xml_diff>